<commit_message>
Issue : 기존의 PT에 To-do list 추가
추후 새로운 PT로 정리 필요함.
</commit_message>
<xml_diff>
--- a/etc/pt/IKATool_151111_01.pptx
+++ b/etc/pt/IKATool_151111_01.pptx
@@ -5,21 +5,22 @@
     <p:sldMasterId id="2147483648" r:id="rId1"/>
   </p:sldMasterIdLst>
   <p:notesMasterIdLst>
-    <p:notesMasterId r:id="rId14"/>
+    <p:notesMasterId r:id="rId15"/>
   </p:notesMasterIdLst>
   <p:sldIdLst>
     <p:sldId id="257" r:id="rId2"/>
-    <p:sldId id="358" r:id="rId3"/>
-    <p:sldId id="359" r:id="rId4"/>
-    <p:sldId id="360" r:id="rId5"/>
-    <p:sldId id="355" r:id="rId6"/>
-    <p:sldId id="356" r:id="rId7"/>
-    <p:sldId id="351" r:id="rId8"/>
-    <p:sldId id="346" r:id="rId9"/>
-    <p:sldId id="347" r:id="rId10"/>
-    <p:sldId id="348" r:id="rId11"/>
-    <p:sldId id="349" r:id="rId12"/>
-    <p:sldId id="357" r:id="rId13"/>
+    <p:sldId id="361" r:id="rId3"/>
+    <p:sldId id="358" r:id="rId4"/>
+    <p:sldId id="359" r:id="rId5"/>
+    <p:sldId id="360" r:id="rId6"/>
+    <p:sldId id="355" r:id="rId7"/>
+    <p:sldId id="356" r:id="rId8"/>
+    <p:sldId id="351" r:id="rId9"/>
+    <p:sldId id="346" r:id="rId10"/>
+    <p:sldId id="347" r:id="rId11"/>
+    <p:sldId id="348" r:id="rId12"/>
+    <p:sldId id="349" r:id="rId13"/>
+    <p:sldId id="357" r:id="rId14"/>
   </p:sldIdLst>
   <p:sldSz cx="12192000" cy="6858000"/>
   <p:notesSz cx="6858000" cy="9144000"/>
@@ -208,7 +209,7 @@
           <a:p>
             <a:fld id="{854058B0-8162-864B-AE86-8B8874D98977}" type="datetimeFigureOut">
               <a:rPr lang="en-US" smtClean="0"/>
-              <a:t>11/11/15</a:t>
+              <a:t>11/15/15</a:t>
             </a:fld>
             <a:endParaRPr lang="en-US"/>
           </a:p>
@@ -626,7 +627,7 @@
           <a:p>
             <a:fld id="{77EDDE2A-C972-BB4E-BAA3-29C1A6CCF3D5}" type="slidenum">
               <a:rPr lang="en-US" smtClean="0"/>
-              <a:t>12</a:t>
+              <a:t>13</a:t>
             </a:fld>
             <a:endParaRPr lang="en-US"/>
           </a:p>
@@ -776,7 +777,7 @@
           <a:p>
             <a:fld id="{2CC12CED-D809-214C-AA93-35F0D79786A5}" type="datetimeFigureOut">
               <a:rPr lang="en-US" smtClean="0"/>
-              <a:t>11/11/15</a:t>
+              <a:t>11/15/15</a:t>
             </a:fld>
             <a:endParaRPr lang="en-US"/>
           </a:p>
@@ -946,7 +947,7 @@
           <a:p>
             <a:fld id="{2CC12CED-D809-214C-AA93-35F0D79786A5}" type="datetimeFigureOut">
               <a:rPr lang="en-US" smtClean="0"/>
-              <a:t>11/11/15</a:t>
+              <a:t>11/15/15</a:t>
             </a:fld>
             <a:endParaRPr lang="en-US"/>
           </a:p>
@@ -1126,7 +1127,7 @@
           <a:p>
             <a:fld id="{2CC12CED-D809-214C-AA93-35F0D79786A5}" type="datetimeFigureOut">
               <a:rPr lang="en-US" smtClean="0"/>
-              <a:t>11/11/15</a:t>
+              <a:t>11/15/15</a:t>
             </a:fld>
             <a:endParaRPr lang="en-US"/>
           </a:p>
@@ -2239,7 +2240,7 @@
           <a:p>
             <a:fld id="{2CC12CED-D809-214C-AA93-35F0D79786A5}" type="datetimeFigureOut">
               <a:rPr lang="en-US" smtClean="0"/>
-              <a:t>11/11/15</a:t>
+              <a:t>11/15/15</a:t>
             </a:fld>
             <a:endParaRPr lang="en-US"/>
           </a:p>
@@ -2485,7 +2486,7 @@
           <a:p>
             <a:fld id="{2CC12CED-D809-214C-AA93-35F0D79786A5}" type="datetimeFigureOut">
               <a:rPr lang="en-US" smtClean="0"/>
-              <a:t>11/11/15</a:t>
+              <a:t>11/15/15</a:t>
             </a:fld>
             <a:endParaRPr lang="en-US"/>
           </a:p>
@@ -2717,7 +2718,7 @@
           <a:p>
             <a:fld id="{2CC12CED-D809-214C-AA93-35F0D79786A5}" type="datetimeFigureOut">
               <a:rPr lang="en-US" smtClean="0"/>
-              <a:t>11/11/15</a:t>
+              <a:t>11/15/15</a:t>
             </a:fld>
             <a:endParaRPr lang="en-US"/>
           </a:p>
@@ -3084,7 +3085,7 @@
           <a:p>
             <a:fld id="{2CC12CED-D809-214C-AA93-35F0D79786A5}" type="datetimeFigureOut">
               <a:rPr lang="en-US" smtClean="0"/>
-              <a:t>11/11/15</a:t>
+              <a:t>11/15/15</a:t>
             </a:fld>
             <a:endParaRPr lang="en-US"/>
           </a:p>
@@ -3202,7 +3203,7 @@
           <a:p>
             <a:fld id="{2CC12CED-D809-214C-AA93-35F0D79786A5}" type="datetimeFigureOut">
               <a:rPr lang="en-US" smtClean="0"/>
-              <a:t>11/11/15</a:t>
+              <a:t>11/15/15</a:t>
             </a:fld>
             <a:endParaRPr lang="en-US"/>
           </a:p>
@@ -3297,7 +3298,7 @@
           <a:p>
             <a:fld id="{2CC12CED-D809-214C-AA93-35F0D79786A5}" type="datetimeFigureOut">
               <a:rPr lang="en-US" smtClean="0"/>
-              <a:t>11/11/15</a:t>
+              <a:t>11/15/15</a:t>
             </a:fld>
             <a:endParaRPr lang="en-US"/>
           </a:p>
@@ -3574,7 +3575,7 @@
           <a:p>
             <a:fld id="{2CC12CED-D809-214C-AA93-35F0D79786A5}" type="datetimeFigureOut">
               <a:rPr lang="en-US" smtClean="0"/>
-              <a:t>11/11/15</a:t>
+              <a:t>11/15/15</a:t>
             </a:fld>
             <a:endParaRPr lang="en-US"/>
           </a:p>
@@ -3827,7 +3828,7 @@
           <a:p>
             <a:fld id="{2CC12CED-D809-214C-AA93-35F0D79786A5}" type="datetimeFigureOut">
               <a:rPr lang="en-US" smtClean="0"/>
-              <a:t>11/11/15</a:t>
+              <a:t>11/15/15</a:t>
             </a:fld>
             <a:endParaRPr lang="en-US"/>
           </a:p>
@@ -4040,7 +4041,7 @@
           <a:p>
             <a:fld id="{2CC12CED-D809-214C-AA93-35F0D79786A5}" type="datetimeFigureOut">
               <a:rPr lang="en-US" smtClean="0"/>
-              <a:t>11/11/15</a:t>
+              <a:t>11/15/15</a:t>
             </a:fld>
             <a:endParaRPr lang="en-US"/>
           </a:p>
@@ -4618,7 +4619,27 @@
           <a:p>
             <a:r>
               <a:rPr lang="en-US" altLang="ko-KR" dirty="0" smtClean="0"/>
-              <a:t>GUI Goal</a:t>
+              <a:t>Data</a:t>
+            </a:r>
+            <a:r>
+              <a:rPr lang="ko-KR" altLang="en-US" dirty="0" smtClean="0"/>
+              <a:t>의 </a:t>
+            </a:r>
+            <a:r>
+              <a:rPr lang="en-US" altLang="ko-KR" dirty="0" smtClean="0"/>
+              <a:t>Class Diagram</a:t>
+            </a:r>
+            <a:r>
+              <a:rPr lang="ko-KR" altLang="en-US" dirty="0" smtClean="0"/>
+              <a:t> </a:t>
+            </a:r>
+            <a:r>
+              <a:rPr lang="en-US" altLang="ko-KR" dirty="0" err="1" smtClean="0"/>
+              <a:t>Ver</a:t>
+            </a:r>
+            <a:r>
+              <a:rPr lang="en-US" altLang="ko-KR" dirty="0" smtClean="0"/>
+              <a:t> 0.1</a:t>
             </a:r>
             <a:endParaRPr lang="ko-KR" altLang="en-US" dirty="0"/>
           </a:p>
@@ -4818,6 +4839,592 @@
           </a:p>
         </p:txBody>
       </p:sp>
+      <p:pic>
+        <p:nvPicPr>
+          <p:cNvPr id="3" name="Picture 2"/>
+          <p:cNvPicPr>
+            <a:picLocks noChangeAspect="1"/>
+          </p:cNvPicPr>
+          <p:nvPr/>
+        </p:nvPicPr>
+        <p:blipFill>
+          <a:blip r:embed="rId2">
+            <a:extLst>
+              <a:ext uri="{28A0092B-C50C-407E-A947-70E740481C1C}">
+                <a14:useLocalDpi xmlns:a14="http://schemas.microsoft.com/office/drawing/2010/main" val="0"/>
+              </a:ext>
+            </a:extLst>
+          </a:blip>
+          <a:stretch>
+            <a:fillRect/>
+          </a:stretch>
+        </p:blipFill>
+        <p:spPr>
+          <a:xfrm>
+            <a:off x="1374531" y="881101"/>
+            <a:ext cx="9442938" cy="5633050"/>
+          </a:xfrm>
+          <a:prstGeom prst="rect">
+            <a:avLst/>
+          </a:prstGeom>
+        </p:spPr>
+      </p:pic>
+      <p:sp>
+        <p:nvSpPr>
+          <p:cNvPr id="5" name="Rectangle 4"/>
+          <p:cNvSpPr/>
+          <p:nvPr/>
+        </p:nvSpPr>
+        <p:spPr>
+          <a:xfrm>
+            <a:off x="8311662" y="1008183"/>
+            <a:ext cx="2555630" cy="2543909"/>
+          </a:xfrm>
+          <a:prstGeom prst="rect">
+            <a:avLst/>
+          </a:prstGeom>
+          <a:noFill/>
+          <a:ln w="19050">
+            <a:prstDash val="solid"/>
+          </a:ln>
+        </p:spPr>
+        <p:style>
+          <a:lnRef idx="2">
+            <a:schemeClr val="accent1">
+              <a:shade val="50000"/>
+            </a:schemeClr>
+          </a:lnRef>
+          <a:fillRef idx="1">
+            <a:schemeClr val="accent1"/>
+          </a:fillRef>
+          <a:effectRef idx="0">
+            <a:schemeClr val="accent1"/>
+          </a:effectRef>
+          <a:fontRef idx="minor">
+            <a:schemeClr val="lt1"/>
+          </a:fontRef>
+        </p:style>
+        <p:txBody>
+          <a:bodyPr rtlCol="0" anchor="ctr"/>
+          <a:lstStyle/>
+          <a:p>
+            <a:pPr algn="ctr"/>
+            <a:endParaRPr lang="en-US"/>
+          </a:p>
+        </p:txBody>
+      </p:sp>
+      <p:sp>
+        <p:nvSpPr>
+          <p:cNvPr id="6" name="TextBox 5"/>
+          <p:cNvSpPr txBox="1"/>
+          <p:nvPr/>
+        </p:nvSpPr>
+        <p:spPr>
+          <a:xfrm>
+            <a:off x="9036120" y="660547"/>
+            <a:ext cx="1106713" cy="307777"/>
+          </a:xfrm>
+          <a:prstGeom prst="rect">
+            <a:avLst/>
+          </a:prstGeom>
+          <a:noFill/>
+        </p:spPr>
+        <p:txBody>
+          <a:bodyPr wrap="none" rtlCol="0">
+            <a:spAutoFit/>
+          </a:bodyPr>
+          <a:lstStyle/>
+          <a:p>
+            <a:r>
+              <a:rPr lang="en-US" sz="1400" dirty="0" smtClean="0"/>
+              <a:t>Rule &amp; Atom</a:t>
+            </a:r>
+            <a:endParaRPr lang="en-US" sz="1400" dirty="0"/>
+          </a:p>
+        </p:txBody>
+      </p:sp>
+      <p:sp>
+        <p:nvSpPr>
+          <p:cNvPr id="8" name="Rectangle 7"/>
+          <p:cNvSpPr/>
+          <p:nvPr/>
+        </p:nvSpPr>
+        <p:spPr>
+          <a:xfrm>
+            <a:off x="3077308" y="968325"/>
+            <a:ext cx="3043604" cy="3199230"/>
+          </a:xfrm>
+          <a:prstGeom prst="rect">
+            <a:avLst/>
+          </a:prstGeom>
+          <a:noFill/>
+          <a:ln w="19050">
+            <a:solidFill>
+              <a:schemeClr val="tx2"/>
+            </a:solidFill>
+            <a:prstDash val="solid"/>
+          </a:ln>
+        </p:spPr>
+        <p:style>
+          <a:lnRef idx="2">
+            <a:schemeClr val="accent1">
+              <a:shade val="50000"/>
+            </a:schemeClr>
+          </a:lnRef>
+          <a:fillRef idx="1">
+            <a:schemeClr val="accent1"/>
+          </a:fillRef>
+          <a:effectRef idx="0">
+            <a:schemeClr val="accent1"/>
+          </a:effectRef>
+          <a:fontRef idx="minor">
+            <a:schemeClr val="lt1"/>
+          </a:fontRef>
+        </p:style>
+        <p:txBody>
+          <a:bodyPr rtlCol="0" anchor="ctr"/>
+          <a:lstStyle/>
+          <a:p>
+            <a:pPr algn="ctr"/>
+            <a:endParaRPr lang="en-US"/>
+          </a:p>
+        </p:txBody>
+      </p:sp>
+      <p:sp>
+        <p:nvSpPr>
+          <p:cNvPr id="9" name="TextBox 8"/>
+          <p:cNvSpPr txBox="1"/>
+          <p:nvPr/>
+        </p:nvSpPr>
+        <p:spPr>
+          <a:xfrm>
+            <a:off x="2238267" y="1909371"/>
+            <a:ext cx="705065" cy="307777"/>
+          </a:xfrm>
+          <a:prstGeom prst="rect">
+            <a:avLst/>
+          </a:prstGeom>
+          <a:noFill/>
+        </p:spPr>
+        <p:txBody>
+          <a:bodyPr wrap="none" rtlCol="0">
+            <a:spAutoFit/>
+          </a:bodyPr>
+          <a:lstStyle/>
+          <a:p>
+            <a:r>
+              <a:rPr lang="en-US" sz="1400" dirty="0" smtClean="0"/>
+              <a:t>Patient</a:t>
+            </a:r>
+            <a:endParaRPr lang="en-US" sz="1400" dirty="0"/>
+          </a:p>
+        </p:txBody>
+      </p:sp>
+      <p:sp>
+        <p:nvSpPr>
+          <p:cNvPr id="10" name="Rectangle 9"/>
+          <p:cNvSpPr/>
+          <p:nvPr/>
+        </p:nvSpPr>
+        <p:spPr>
+          <a:xfrm>
+            <a:off x="3229708" y="4468115"/>
+            <a:ext cx="2891204" cy="1797870"/>
+          </a:xfrm>
+          <a:prstGeom prst="rect">
+            <a:avLst/>
+          </a:prstGeom>
+          <a:noFill/>
+          <a:ln w="19050">
+            <a:solidFill>
+              <a:srgbClr val="FFC000"/>
+            </a:solidFill>
+            <a:prstDash val="solid"/>
+          </a:ln>
+        </p:spPr>
+        <p:style>
+          <a:lnRef idx="2">
+            <a:schemeClr val="accent1">
+              <a:shade val="50000"/>
+            </a:schemeClr>
+          </a:lnRef>
+          <a:fillRef idx="1">
+            <a:schemeClr val="accent1"/>
+          </a:fillRef>
+          <a:effectRef idx="0">
+            <a:schemeClr val="accent1"/>
+          </a:effectRef>
+          <a:fontRef idx="minor">
+            <a:schemeClr val="lt1"/>
+          </a:fontRef>
+        </p:style>
+        <p:txBody>
+          <a:bodyPr rtlCol="0" anchor="ctr"/>
+          <a:lstStyle/>
+          <a:p>
+            <a:pPr algn="ctr"/>
+            <a:endParaRPr lang="en-US"/>
+          </a:p>
+        </p:txBody>
+      </p:sp>
+      <p:sp>
+        <p:nvSpPr>
+          <p:cNvPr id="11" name="TextBox 10"/>
+          <p:cNvSpPr txBox="1"/>
+          <p:nvPr/>
+        </p:nvSpPr>
+        <p:spPr>
+          <a:xfrm>
+            <a:off x="4268948" y="6258768"/>
+            <a:ext cx="812723" cy="307777"/>
+          </a:xfrm>
+          <a:prstGeom prst="rect">
+            <a:avLst/>
+          </a:prstGeom>
+          <a:noFill/>
+        </p:spPr>
+        <p:txBody>
+          <a:bodyPr wrap="none" rtlCol="0">
+            <a:spAutoFit/>
+          </a:bodyPr>
+          <a:lstStyle/>
+          <a:p>
+            <a:r>
+              <a:rPr lang="en-US" sz="1400" dirty="0" err="1" smtClean="0"/>
+              <a:t>TestItem</a:t>
+            </a:r>
+            <a:endParaRPr lang="en-US" sz="1400" dirty="0"/>
+          </a:p>
+        </p:txBody>
+      </p:sp>
+      <p:sp>
+        <p:nvSpPr>
+          <p:cNvPr id="12" name="Rectangle 11"/>
+          <p:cNvSpPr/>
+          <p:nvPr/>
+        </p:nvSpPr>
+        <p:spPr>
+          <a:xfrm>
+            <a:off x="6836735" y="1199057"/>
+            <a:ext cx="1313121" cy="1779423"/>
+          </a:xfrm>
+          <a:prstGeom prst="rect">
+            <a:avLst/>
+          </a:prstGeom>
+          <a:noFill/>
+          <a:ln w="19050">
+            <a:prstDash val="dash"/>
+          </a:ln>
+        </p:spPr>
+        <p:style>
+          <a:lnRef idx="2">
+            <a:schemeClr val="accent1">
+              <a:shade val="50000"/>
+            </a:schemeClr>
+          </a:lnRef>
+          <a:fillRef idx="1">
+            <a:schemeClr val="accent1"/>
+          </a:fillRef>
+          <a:effectRef idx="0">
+            <a:schemeClr val="accent1"/>
+          </a:effectRef>
+          <a:fontRef idx="minor">
+            <a:schemeClr val="lt1"/>
+          </a:fontRef>
+        </p:style>
+        <p:txBody>
+          <a:bodyPr rtlCol="0" anchor="ctr"/>
+          <a:lstStyle/>
+          <a:p>
+            <a:pPr algn="ctr"/>
+            <a:endParaRPr lang="en-US"/>
+          </a:p>
+        </p:txBody>
+      </p:sp>
+      <p:sp>
+        <p:nvSpPr>
+          <p:cNvPr id="14" name="TextBox 13"/>
+          <p:cNvSpPr txBox="1"/>
+          <p:nvPr/>
+        </p:nvSpPr>
+        <p:spPr>
+          <a:xfrm>
+            <a:off x="6970570" y="894889"/>
+            <a:ext cx="853119" cy="307777"/>
+          </a:xfrm>
+          <a:prstGeom prst="rect">
+            <a:avLst/>
+          </a:prstGeom>
+          <a:noFill/>
+        </p:spPr>
+        <p:txBody>
+          <a:bodyPr wrap="none" rtlCol="0">
+            <a:spAutoFit/>
+          </a:bodyPr>
+          <a:lstStyle/>
+          <a:p>
+            <a:r>
+              <a:rPr lang="en-US" sz="1400" dirty="0" smtClean="0"/>
+              <a:t>Ontology</a:t>
+            </a:r>
+            <a:endParaRPr lang="en-US" sz="1400" dirty="0"/>
+          </a:p>
+        </p:txBody>
+      </p:sp>
+    </p:spTree>
+    <p:extLst>
+      <p:ext uri="{BB962C8B-B14F-4D97-AF65-F5344CB8AC3E}">
+        <p14:creationId xmlns:p14="http://schemas.microsoft.com/office/powerpoint/2010/main" val="263511649"/>
+      </p:ext>
+    </p:extLst>
+  </p:cSld>
+  <p:clrMapOvr>
+    <a:masterClrMapping/>
+  </p:clrMapOvr>
+  <p:timing>
+    <p:tnLst>
+      <p:par>
+        <p:cTn id="1" dur="indefinite" restart="never" nodeType="tmRoot"/>
+      </p:par>
+    </p:tnLst>
+  </p:timing>
+</p:sld>
+</file>
+
+<file path=ppt/slides/slide11.xml><?xml version="1.0" encoding="utf-8"?>
+<p:sld xmlns:a="http://schemas.openxmlformats.org/drawingml/2006/main" xmlns:r="http://schemas.openxmlformats.org/officeDocument/2006/relationships" xmlns:p="http://schemas.openxmlformats.org/presentationml/2006/main">
+  <p:cSld>
+    <p:spTree>
+      <p:nvGrpSpPr>
+        <p:cNvPr id="1" name=""/>
+        <p:cNvGrpSpPr/>
+        <p:nvPr/>
+      </p:nvGrpSpPr>
+      <p:grpSpPr>
+        <a:xfrm>
+          <a:off x="0" y="0"/>
+          <a:ext cx="0" cy="0"/>
+          <a:chOff x="0" y="0"/>
+          <a:chExt cx="0" cy="0"/>
+        </a:xfrm>
+      </p:grpSpPr>
+      <p:sp>
+        <p:nvSpPr>
+          <p:cNvPr id="2" name="제목 1"/>
+          <p:cNvSpPr>
+            <a:spLocks noGrp="1"/>
+          </p:cNvSpPr>
+          <p:nvPr>
+            <p:ph type="title"/>
+          </p:nvPr>
+        </p:nvSpPr>
+        <p:spPr/>
+        <p:txBody>
+          <a:bodyPr/>
+          <a:lstStyle/>
+          <a:p>
+            <a:r>
+              <a:rPr lang="en-US" altLang="ko-KR" dirty="0" smtClean="0"/>
+              <a:t>GUI Goal</a:t>
+            </a:r>
+            <a:endParaRPr lang="ko-KR" altLang="en-US" dirty="0"/>
+          </a:p>
+        </p:txBody>
+      </p:sp>
+      <p:sp>
+        <p:nvSpPr>
+          <p:cNvPr id="4" name="Content Placeholder 2"/>
+          <p:cNvSpPr txBox="1">
+            <a:spLocks/>
+          </p:cNvSpPr>
+          <p:nvPr/>
+        </p:nvSpPr>
+        <p:spPr>
+          <a:xfrm>
+            <a:off x="838200" y="1181661"/>
+            <a:ext cx="10515600" cy="4351338"/>
+          </a:xfrm>
+          <a:prstGeom prst="rect">
+            <a:avLst/>
+          </a:prstGeom>
+        </p:spPr>
+        <p:txBody>
+          <a:bodyPr/>
+          <a:lstStyle>
+            <a:lvl1pPr marL="228600" indent="-228600" algn="l" defTabSz="914400" rtl="0" eaLnBrk="1" latinLnBrk="0" hangingPunct="1">
+              <a:lnSpc>
+                <a:spcPct val="90000"/>
+              </a:lnSpc>
+              <a:spcBef>
+                <a:spcPts val="1000"/>
+              </a:spcBef>
+              <a:buFont typeface="Arial"/>
+              <a:buChar char="•"/>
+              <a:defRPr sz="2800" kern="1200">
+                <a:solidFill>
+                  <a:schemeClr val="tx1"/>
+                </a:solidFill>
+                <a:latin typeface="+mn-lt"/>
+                <a:ea typeface="+mn-ea"/>
+                <a:cs typeface="+mn-cs"/>
+              </a:defRPr>
+            </a:lvl1pPr>
+            <a:lvl2pPr marL="685800" indent="-228600" algn="l" defTabSz="914400" rtl="0" eaLnBrk="1" latinLnBrk="0" hangingPunct="1">
+              <a:lnSpc>
+                <a:spcPct val="90000"/>
+              </a:lnSpc>
+              <a:spcBef>
+                <a:spcPts val="500"/>
+              </a:spcBef>
+              <a:buFont typeface="Arial"/>
+              <a:buChar char="•"/>
+              <a:defRPr sz="2400" kern="1200">
+                <a:solidFill>
+                  <a:schemeClr val="tx1"/>
+                </a:solidFill>
+                <a:latin typeface="+mn-lt"/>
+                <a:ea typeface="+mn-ea"/>
+                <a:cs typeface="+mn-cs"/>
+              </a:defRPr>
+            </a:lvl2pPr>
+            <a:lvl3pPr marL="1143000" indent="-228600" algn="l" defTabSz="914400" rtl="0" eaLnBrk="1" latinLnBrk="0" hangingPunct="1">
+              <a:lnSpc>
+                <a:spcPct val="90000"/>
+              </a:lnSpc>
+              <a:spcBef>
+                <a:spcPts val="500"/>
+              </a:spcBef>
+              <a:buFont typeface="Arial"/>
+              <a:buChar char="•"/>
+              <a:defRPr sz="2000" kern="1200">
+                <a:solidFill>
+                  <a:schemeClr val="tx1"/>
+                </a:solidFill>
+                <a:latin typeface="+mn-lt"/>
+                <a:ea typeface="+mn-ea"/>
+                <a:cs typeface="+mn-cs"/>
+              </a:defRPr>
+            </a:lvl3pPr>
+            <a:lvl4pPr marL="1600200" indent="-228600" algn="l" defTabSz="914400" rtl="0" eaLnBrk="1" latinLnBrk="0" hangingPunct="1">
+              <a:lnSpc>
+                <a:spcPct val="90000"/>
+              </a:lnSpc>
+              <a:spcBef>
+                <a:spcPts val="500"/>
+              </a:spcBef>
+              <a:buFont typeface="Arial"/>
+              <a:buChar char="•"/>
+              <a:defRPr sz="1800" kern="1200">
+                <a:solidFill>
+                  <a:schemeClr val="tx1"/>
+                </a:solidFill>
+                <a:latin typeface="+mn-lt"/>
+                <a:ea typeface="+mn-ea"/>
+                <a:cs typeface="+mn-cs"/>
+              </a:defRPr>
+            </a:lvl4pPr>
+            <a:lvl5pPr marL="2057400" indent="-228600" algn="l" defTabSz="914400" rtl="0" eaLnBrk="1" latinLnBrk="0" hangingPunct="1">
+              <a:lnSpc>
+                <a:spcPct val="90000"/>
+              </a:lnSpc>
+              <a:spcBef>
+                <a:spcPts val="500"/>
+              </a:spcBef>
+              <a:buFont typeface="Arial"/>
+              <a:buChar char="•"/>
+              <a:defRPr sz="1800" kern="1200">
+                <a:solidFill>
+                  <a:schemeClr val="tx1"/>
+                </a:solidFill>
+                <a:latin typeface="+mn-lt"/>
+                <a:ea typeface="+mn-ea"/>
+                <a:cs typeface="+mn-cs"/>
+              </a:defRPr>
+            </a:lvl5pPr>
+            <a:lvl6pPr marL="2514600" indent="-228600" algn="l" defTabSz="914400" rtl="0" eaLnBrk="1" latinLnBrk="0" hangingPunct="1">
+              <a:lnSpc>
+                <a:spcPct val="90000"/>
+              </a:lnSpc>
+              <a:spcBef>
+                <a:spcPts val="500"/>
+              </a:spcBef>
+              <a:buFont typeface="Arial"/>
+              <a:buChar char="•"/>
+              <a:defRPr sz="1800" kern="1200">
+                <a:solidFill>
+                  <a:schemeClr val="tx1"/>
+                </a:solidFill>
+                <a:latin typeface="+mn-lt"/>
+                <a:ea typeface="+mn-ea"/>
+                <a:cs typeface="+mn-cs"/>
+              </a:defRPr>
+            </a:lvl6pPr>
+            <a:lvl7pPr marL="2971800" indent="-228600" algn="l" defTabSz="914400" rtl="0" eaLnBrk="1" latinLnBrk="0" hangingPunct="1">
+              <a:lnSpc>
+                <a:spcPct val="90000"/>
+              </a:lnSpc>
+              <a:spcBef>
+                <a:spcPts val="500"/>
+              </a:spcBef>
+              <a:buFont typeface="Arial"/>
+              <a:buChar char="•"/>
+              <a:defRPr sz="1800" kern="1200">
+                <a:solidFill>
+                  <a:schemeClr val="tx1"/>
+                </a:solidFill>
+                <a:latin typeface="+mn-lt"/>
+                <a:ea typeface="+mn-ea"/>
+                <a:cs typeface="+mn-cs"/>
+              </a:defRPr>
+            </a:lvl7pPr>
+            <a:lvl8pPr marL="3429000" indent="-228600" algn="l" defTabSz="914400" rtl="0" eaLnBrk="1" latinLnBrk="0" hangingPunct="1">
+              <a:lnSpc>
+                <a:spcPct val="90000"/>
+              </a:lnSpc>
+              <a:spcBef>
+                <a:spcPts val="500"/>
+              </a:spcBef>
+              <a:buFont typeface="Arial"/>
+              <a:buChar char="•"/>
+              <a:defRPr sz="1800" kern="1200">
+                <a:solidFill>
+                  <a:schemeClr val="tx1"/>
+                </a:solidFill>
+                <a:latin typeface="+mn-lt"/>
+                <a:ea typeface="+mn-ea"/>
+                <a:cs typeface="+mn-cs"/>
+              </a:defRPr>
+            </a:lvl8pPr>
+            <a:lvl9pPr marL="3886200" indent="-228600" algn="l" defTabSz="914400" rtl="0" eaLnBrk="1" latinLnBrk="0" hangingPunct="1">
+              <a:lnSpc>
+                <a:spcPct val="90000"/>
+              </a:lnSpc>
+              <a:spcBef>
+                <a:spcPts val="500"/>
+              </a:spcBef>
+              <a:buFont typeface="Arial"/>
+              <a:buChar char="•"/>
+              <a:defRPr sz="1800" kern="1200">
+                <a:solidFill>
+                  <a:schemeClr val="tx1"/>
+                </a:solidFill>
+                <a:latin typeface="+mn-lt"/>
+                <a:ea typeface="+mn-ea"/>
+                <a:cs typeface="+mn-cs"/>
+              </a:defRPr>
+            </a:lvl9pPr>
+          </a:lstStyle>
+          <a:p>
+            <a:pPr marL="0" indent="0">
+              <a:lnSpc>
+                <a:spcPct val="100000"/>
+              </a:lnSpc>
+              <a:buNone/>
+            </a:pPr>
+            <a:endParaRPr lang="en-US" sz="2000" dirty="0"/>
+          </a:p>
+        </p:txBody>
+      </p:sp>
       <p:sp>
         <p:nvSpPr>
           <p:cNvPr id="5" name="TextBox 4"/>
@@ -4935,7 +5542,7 @@
 </p:sld>
 </file>
 
-<file path=ppt/slides/slide11.xml><?xml version="1.0" encoding="utf-8"?>
+<file path=ppt/slides/slide12.xml><?xml version="1.0" encoding="utf-8"?>
 <p:sld xmlns:a="http://schemas.openxmlformats.org/drawingml/2006/main" xmlns:r="http://schemas.openxmlformats.org/officeDocument/2006/relationships" xmlns:p="http://schemas.openxmlformats.org/presentationml/2006/main">
   <p:cSld>
     <p:spTree>
@@ -5732,7 +6339,7 @@
 </p:sld>
 </file>
 
-<file path=ppt/slides/slide12.xml><?xml version="1.0" encoding="utf-8"?>
+<file path=ppt/slides/slide13.xml><?xml version="1.0" encoding="utf-8"?>
 <p:sld xmlns:a="http://schemas.openxmlformats.org/drawingml/2006/main" xmlns:r="http://schemas.openxmlformats.org/officeDocument/2006/relationships" xmlns:p="http://schemas.openxmlformats.org/presentationml/2006/main">
   <p:cSld>
     <p:spTree>
@@ -5811,6 +6418,142 @@
       </p:grpSpPr>
       <p:sp>
         <p:nvSpPr>
+          <p:cNvPr id="2" name="Text Placeholder 1"/>
+          <p:cNvSpPr>
+            <a:spLocks noGrp="1"/>
+          </p:cNvSpPr>
+          <p:nvPr>
+            <p:ph type="body" sz="quarter" idx="11"/>
+          </p:nvPr>
+        </p:nvSpPr>
+        <p:spPr/>
+        <p:txBody>
+          <a:bodyPr/>
+          <a:lstStyle/>
+          <a:p>
+            <a:r>
+              <a:rPr lang="ko-KR" altLang="en-US" dirty="0" smtClean="0"/>
+              <a:t>이전 자료</a:t>
+            </a:r>
+            <a:endParaRPr lang="en-US" dirty="0"/>
+          </a:p>
+        </p:txBody>
+      </p:sp>
+      <p:sp>
+        <p:nvSpPr>
+          <p:cNvPr id="3" name="Text Placeholder 2"/>
+          <p:cNvSpPr>
+            <a:spLocks noGrp="1"/>
+          </p:cNvSpPr>
+          <p:nvPr>
+            <p:ph type="body" sz="quarter" idx="12"/>
+          </p:nvPr>
+        </p:nvSpPr>
+        <p:spPr/>
+        <p:txBody>
+          <a:bodyPr/>
+          <a:lstStyle/>
+          <a:p>
+            <a:endParaRPr lang="en-US"/>
+          </a:p>
+        </p:txBody>
+      </p:sp>
+      <p:sp>
+        <p:nvSpPr>
+          <p:cNvPr id="4" name="Text Placeholder 3"/>
+          <p:cNvSpPr>
+            <a:spLocks noGrp="1"/>
+          </p:cNvSpPr>
+          <p:nvPr>
+            <p:ph type="body" sz="quarter" idx="13"/>
+          </p:nvPr>
+        </p:nvSpPr>
+        <p:spPr/>
+        <p:txBody>
+          <a:bodyPr/>
+          <a:lstStyle/>
+          <a:p>
+            <a:endParaRPr lang="en-US"/>
+          </a:p>
+        </p:txBody>
+      </p:sp>
+      <p:sp>
+        <p:nvSpPr>
+          <p:cNvPr id="5" name="Text Placeholder 4"/>
+          <p:cNvSpPr>
+            <a:spLocks noGrp="1"/>
+          </p:cNvSpPr>
+          <p:nvPr>
+            <p:ph type="body" sz="quarter" idx="14"/>
+          </p:nvPr>
+        </p:nvSpPr>
+        <p:spPr/>
+        <p:txBody>
+          <a:bodyPr/>
+          <a:lstStyle/>
+          <a:p>
+            <a:endParaRPr lang="en-US"/>
+          </a:p>
+        </p:txBody>
+      </p:sp>
+      <p:sp>
+        <p:nvSpPr>
+          <p:cNvPr id="6" name="Title 5"/>
+          <p:cNvSpPr>
+            <a:spLocks noGrp="1"/>
+          </p:cNvSpPr>
+          <p:nvPr>
+            <p:ph type="title"/>
+          </p:nvPr>
+        </p:nvSpPr>
+        <p:spPr/>
+        <p:txBody>
+          <a:bodyPr/>
+          <a:lstStyle/>
+          <a:p>
+            <a:endParaRPr lang="en-US"/>
+          </a:p>
+        </p:txBody>
+      </p:sp>
+    </p:spTree>
+    <p:extLst>
+      <p:ext uri="{BB962C8B-B14F-4D97-AF65-F5344CB8AC3E}">
+        <p14:creationId xmlns:p14="http://schemas.microsoft.com/office/powerpoint/2010/main" val="222468489"/>
+      </p:ext>
+    </p:extLst>
+  </p:cSld>
+  <p:clrMapOvr>
+    <a:masterClrMapping/>
+  </p:clrMapOvr>
+  <p:timing>
+    <p:tnLst>
+      <p:par>
+        <p:cTn id="1" dur="indefinite" restart="never" nodeType="tmRoot"/>
+      </p:par>
+    </p:tnLst>
+  </p:timing>
+</p:sld>
+</file>
+
+<file path=ppt/slides/slide3.xml><?xml version="1.0" encoding="utf-8"?>
+<p:sld xmlns:a="http://schemas.openxmlformats.org/drawingml/2006/main" xmlns:r="http://schemas.openxmlformats.org/officeDocument/2006/relationships" xmlns:p="http://schemas.openxmlformats.org/presentationml/2006/main">
+  <p:cSld>
+    <p:spTree>
+      <p:nvGrpSpPr>
+        <p:cNvPr id="1" name=""/>
+        <p:cNvGrpSpPr/>
+        <p:nvPr/>
+      </p:nvGrpSpPr>
+      <p:grpSpPr>
+        <a:xfrm>
+          <a:off x="0" y="0"/>
+          <a:ext cx="0" cy="0"/>
+          <a:chOff x="0" y="0"/>
+          <a:chExt cx="0" cy="0"/>
+        </a:xfrm>
+      </p:grpSpPr>
+      <p:sp>
+        <p:nvSpPr>
           <p:cNvPr id="2" name="제목 1"/>
           <p:cNvSpPr>
             <a:spLocks noGrp="1"/>
@@ -5838,11 +6581,7 @@
             </a:r>
             <a:r>
               <a:rPr lang="en-US" altLang="ko-KR" dirty="0" smtClean="0"/>
-              <a:t> </a:t>
-            </a:r>
-            <a:r>
-              <a:rPr lang="en-US" altLang="ko-KR" dirty="0" smtClean="0"/>
-              <a:t>0.3 [1]</a:t>
+              <a:t> 0.3 [1]</a:t>
             </a:r>
             <a:endParaRPr lang="ko-KR" altLang="en-US" dirty="0"/>
           </a:p>
@@ -5898,7 +6637,7 @@
 </p:sld>
 </file>
 
-<file path=ppt/slides/slide3.xml><?xml version="1.0" encoding="utf-8"?>
+<file path=ppt/slides/slide4.xml><?xml version="1.0" encoding="utf-8"?>
 <p:sld xmlns:a="http://schemas.openxmlformats.org/drawingml/2006/main" xmlns:r="http://schemas.openxmlformats.org/officeDocument/2006/relationships" xmlns:p="http://schemas.openxmlformats.org/presentationml/2006/main">
   <p:cSld>
     <p:spTree>
@@ -5975,11 +6714,7 @@
             </a:r>
             <a:r>
               <a:rPr lang="en-US" altLang="ko-KR" dirty="0" smtClean="0"/>
-              <a:t> </a:t>
-            </a:r>
-            <a:r>
-              <a:rPr lang="en-US" altLang="ko-KR" dirty="0" smtClean="0"/>
-              <a:t>0.3 [2]</a:t>
+              <a:t> 0.3 [2]</a:t>
             </a:r>
             <a:endParaRPr lang="ko-KR" altLang="en-US" dirty="0"/>
           </a:p>
@@ -6146,7 +6881,7 @@
 </p:sld>
 </file>
 
-<file path=ppt/slides/slide4.xml><?xml version="1.0" encoding="utf-8"?>
+<file path=ppt/slides/slide5.xml><?xml version="1.0" encoding="utf-8"?>
 <p:sld xmlns:a="http://schemas.openxmlformats.org/drawingml/2006/main" xmlns:r="http://schemas.openxmlformats.org/officeDocument/2006/relationships" xmlns:p="http://schemas.openxmlformats.org/presentationml/2006/main">
   <p:cSld>
     <p:spTree>
@@ -6192,11 +6927,7 @@
             </a:r>
             <a:r>
               <a:rPr lang="en-US" altLang="ko-KR" dirty="0" smtClean="0"/>
-              <a:t> </a:t>
-            </a:r>
-            <a:r>
-              <a:rPr lang="en-US" altLang="ko-KR" dirty="0" smtClean="0"/>
-              <a:t>0.3 [3]</a:t>
+              <a:t> 0.3 [3]</a:t>
             </a:r>
             <a:endParaRPr lang="ko-KR" altLang="en-US" dirty="0"/>
           </a:p>
@@ -6252,7 +6983,7 @@
 </p:sld>
 </file>
 
-<file path=ppt/slides/slide5.xml><?xml version="1.0" encoding="utf-8"?>
+<file path=ppt/slides/slide6.xml><?xml version="1.0" encoding="utf-8"?>
 <p:sld xmlns:a="http://schemas.openxmlformats.org/drawingml/2006/main" xmlns:r="http://schemas.openxmlformats.org/officeDocument/2006/relationships" xmlns:p="http://schemas.openxmlformats.org/presentationml/2006/main">
   <p:cSld>
     <p:spTree>
@@ -6410,7 +7141,7 @@
 </p:sld>
 </file>
 
-<file path=ppt/slides/slide6.xml><?xml version="1.0" encoding="utf-8"?>
+<file path=ppt/slides/slide7.xml><?xml version="1.0" encoding="utf-8"?>
 <p:sld xmlns:a="http://schemas.openxmlformats.org/drawingml/2006/main" xmlns:r="http://schemas.openxmlformats.org/officeDocument/2006/relationships" xmlns:p="http://schemas.openxmlformats.org/presentationml/2006/main">
   <p:cSld>
     <p:spTree>
@@ -7041,7 +7772,6 @@
               <a:rPr lang="en-US" altLang="ko-KR" sz="2400" dirty="0" smtClean="0"/>
               <a:t>)</a:t>
             </a:r>
-            <a:endParaRPr lang="en-US" altLang="ko-KR" sz="2400" dirty="0" smtClean="0"/>
           </a:p>
           <a:p>
             <a:pPr marL="742950" lvl="1" indent="-285750">
@@ -7205,7 +7935,7 @@
         <p:spPr>
           <a:xfrm>
             <a:off x="742120" y="4326408"/>
-            <a:ext cx="5556073" cy="1446550"/>
+            <a:ext cx="5556073" cy="2062103"/>
           </a:xfrm>
           <a:prstGeom prst="rect">
             <a:avLst/>
@@ -7235,11 +7965,7 @@
             </a:pPr>
             <a:r>
               <a:rPr lang="ko-KR" altLang="en-US" sz="2000" dirty="0" smtClean="0"/>
-              <a:t>환자 </a:t>
-            </a:r>
-            <a:r>
-              <a:rPr lang="ko-KR" altLang="en-US" sz="2000" dirty="0" smtClean="0"/>
-              <a:t>소견 창에서 </a:t>
+              <a:t>환자 소견 창에서 </a:t>
             </a:r>
             <a:r>
               <a:rPr lang="en-US" altLang="ko-KR" sz="2000" dirty="0" smtClean="0"/>
@@ -7259,11 +7985,7 @@
             </a:r>
             <a:r>
               <a:rPr lang="en-US" altLang="ko-KR" sz="2000" dirty="0" smtClean="0"/>
-              <a:t> Bold</a:t>
-            </a:r>
-            <a:r>
-              <a:rPr lang="en-US" altLang="ko-KR" sz="2000" dirty="0" smtClean="0"/>
-              <a:t>)</a:t>
+              <a:t> Bold)</a:t>
             </a:r>
           </a:p>
           <a:p>
@@ -7273,7 +7995,31 @@
             </a:pPr>
             <a:r>
               <a:rPr lang="en-US" altLang="ko-KR" sz="2000" dirty="0" smtClean="0"/>
-              <a:t>Atom Navigator</a:t>
+              <a:t>Atom </a:t>
+            </a:r>
+            <a:r>
+              <a:rPr lang="en-US" altLang="ko-KR" sz="2000" dirty="0" smtClean="0"/>
+              <a:t>Navigator</a:t>
+            </a:r>
+          </a:p>
+          <a:p>
+            <a:pPr marL="742950" lvl="1" indent="-285750">
+              <a:buFont typeface="Arial" charset="0"/>
+              <a:buChar char="•"/>
+            </a:pPr>
+            <a:r>
+              <a:rPr lang="en-US" altLang="ko-KR" sz="2000" dirty="0" smtClean="0"/>
+              <a:t>Rule Navigator</a:t>
+            </a:r>
+          </a:p>
+          <a:p>
+            <a:pPr marL="742950" lvl="1" indent="-285750">
+              <a:buFont typeface="Arial" charset="0"/>
+              <a:buChar char="•"/>
+            </a:pPr>
+            <a:r>
+              <a:rPr lang="en-US" altLang="ko-KR" sz="2000" dirty="0" smtClean="0"/>
+              <a:t>Auto Save</a:t>
             </a:r>
             <a:endParaRPr lang="en-US" altLang="ko-KR" sz="2000" dirty="0" smtClean="0"/>
           </a:p>
@@ -7302,7 +8048,7 @@
 </p:sld>
 </file>
 
-<file path=ppt/slides/slide7.xml><?xml version="1.0" encoding="utf-8"?>
+<file path=ppt/slides/slide8.xml><?xml version="1.0" encoding="utf-8"?>
 <p:sld xmlns:a="http://schemas.openxmlformats.org/drawingml/2006/main" xmlns:r="http://schemas.openxmlformats.org/officeDocument/2006/relationships" xmlns:p="http://schemas.openxmlformats.org/presentationml/2006/main">
   <p:cSld>
     <p:spTree>
@@ -7438,7 +8184,7 @@
 </p:sld>
 </file>
 
-<file path=ppt/slides/slide8.xml><?xml version="1.0" encoding="utf-8"?>
+<file path=ppt/slides/slide9.xml><?xml version="1.0" encoding="utf-8"?>
 <p:sld xmlns:a="http://schemas.openxmlformats.org/drawingml/2006/main" xmlns:r="http://schemas.openxmlformats.org/officeDocument/2006/relationships" xmlns:p="http://schemas.openxmlformats.org/presentationml/2006/main">
   <p:cSld>
     <p:spTree>
@@ -7752,612 +8498,6 @@
     <p:extLst>
       <p:ext uri="{BB962C8B-B14F-4D97-AF65-F5344CB8AC3E}">
         <p14:creationId xmlns:p14="http://schemas.microsoft.com/office/powerpoint/2010/main" val="318561886"/>
-      </p:ext>
-    </p:extLst>
-  </p:cSld>
-  <p:clrMapOvr>
-    <a:masterClrMapping/>
-  </p:clrMapOvr>
-  <p:timing>
-    <p:tnLst>
-      <p:par>
-        <p:cTn id="1" dur="indefinite" restart="never" nodeType="tmRoot"/>
-      </p:par>
-    </p:tnLst>
-  </p:timing>
-</p:sld>
-</file>
-
-<file path=ppt/slides/slide9.xml><?xml version="1.0" encoding="utf-8"?>
-<p:sld xmlns:a="http://schemas.openxmlformats.org/drawingml/2006/main" xmlns:r="http://schemas.openxmlformats.org/officeDocument/2006/relationships" xmlns:p="http://schemas.openxmlformats.org/presentationml/2006/main">
-  <p:cSld>
-    <p:spTree>
-      <p:nvGrpSpPr>
-        <p:cNvPr id="1" name=""/>
-        <p:cNvGrpSpPr/>
-        <p:nvPr/>
-      </p:nvGrpSpPr>
-      <p:grpSpPr>
-        <a:xfrm>
-          <a:off x="0" y="0"/>
-          <a:ext cx="0" cy="0"/>
-          <a:chOff x="0" y="0"/>
-          <a:chExt cx="0" cy="0"/>
-        </a:xfrm>
-      </p:grpSpPr>
-      <p:sp>
-        <p:nvSpPr>
-          <p:cNvPr id="2" name="제목 1"/>
-          <p:cNvSpPr>
-            <a:spLocks noGrp="1"/>
-          </p:cNvSpPr>
-          <p:nvPr>
-            <p:ph type="title"/>
-          </p:nvPr>
-        </p:nvSpPr>
-        <p:spPr/>
-        <p:txBody>
-          <a:bodyPr/>
-          <a:lstStyle/>
-          <a:p>
-            <a:r>
-              <a:rPr lang="en-US" altLang="ko-KR" dirty="0" smtClean="0"/>
-              <a:t>Data</a:t>
-            </a:r>
-            <a:r>
-              <a:rPr lang="ko-KR" altLang="en-US" dirty="0" smtClean="0"/>
-              <a:t>의 </a:t>
-            </a:r>
-            <a:r>
-              <a:rPr lang="en-US" altLang="ko-KR" dirty="0" smtClean="0"/>
-              <a:t>Class Diagram</a:t>
-            </a:r>
-            <a:r>
-              <a:rPr lang="ko-KR" altLang="en-US" dirty="0" smtClean="0"/>
-              <a:t> </a:t>
-            </a:r>
-            <a:r>
-              <a:rPr lang="en-US" altLang="ko-KR" dirty="0" err="1" smtClean="0"/>
-              <a:t>Ver</a:t>
-            </a:r>
-            <a:r>
-              <a:rPr lang="en-US" altLang="ko-KR" dirty="0" smtClean="0"/>
-              <a:t> 0.1</a:t>
-            </a:r>
-            <a:endParaRPr lang="ko-KR" altLang="en-US" dirty="0"/>
-          </a:p>
-        </p:txBody>
-      </p:sp>
-      <p:sp>
-        <p:nvSpPr>
-          <p:cNvPr id="4" name="Content Placeholder 2"/>
-          <p:cNvSpPr txBox="1">
-            <a:spLocks/>
-          </p:cNvSpPr>
-          <p:nvPr/>
-        </p:nvSpPr>
-        <p:spPr>
-          <a:xfrm>
-            <a:off x="838200" y="1181661"/>
-            <a:ext cx="10515600" cy="4351338"/>
-          </a:xfrm>
-          <a:prstGeom prst="rect">
-            <a:avLst/>
-          </a:prstGeom>
-        </p:spPr>
-        <p:txBody>
-          <a:bodyPr/>
-          <a:lstStyle>
-            <a:lvl1pPr marL="228600" indent="-228600" algn="l" defTabSz="914400" rtl="0" eaLnBrk="1" latinLnBrk="0" hangingPunct="1">
-              <a:lnSpc>
-                <a:spcPct val="90000"/>
-              </a:lnSpc>
-              <a:spcBef>
-                <a:spcPts val="1000"/>
-              </a:spcBef>
-              <a:buFont typeface="Arial"/>
-              <a:buChar char="•"/>
-              <a:defRPr sz="2800" kern="1200">
-                <a:solidFill>
-                  <a:schemeClr val="tx1"/>
-                </a:solidFill>
-                <a:latin typeface="+mn-lt"/>
-                <a:ea typeface="+mn-ea"/>
-                <a:cs typeface="+mn-cs"/>
-              </a:defRPr>
-            </a:lvl1pPr>
-            <a:lvl2pPr marL="685800" indent="-228600" algn="l" defTabSz="914400" rtl="0" eaLnBrk="1" latinLnBrk="0" hangingPunct="1">
-              <a:lnSpc>
-                <a:spcPct val="90000"/>
-              </a:lnSpc>
-              <a:spcBef>
-                <a:spcPts val="500"/>
-              </a:spcBef>
-              <a:buFont typeface="Arial"/>
-              <a:buChar char="•"/>
-              <a:defRPr sz="2400" kern="1200">
-                <a:solidFill>
-                  <a:schemeClr val="tx1"/>
-                </a:solidFill>
-                <a:latin typeface="+mn-lt"/>
-                <a:ea typeface="+mn-ea"/>
-                <a:cs typeface="+mn-cs"/>
-              </a:defRPr>
-            </a:lvl2pPr>
-            <a:lvl3pPr marL="1143000" indent="-228600" algn="l" defTabSz="914400" rtl="0" eaLnBrk="1" latinLnBrk="0" hangingPunct="1">
-              <a:lnSpc>
-                <a:spcPct val="90000"/>
-              </a:lnSpc>
-              <a:spcBef>
-                <a:spcPts val="500"/>
-              </a:spcBef>
-              <a:buFont typeface="Arial"/>
-              <a:buChar char="•"/>
-              <a:defRPr sz="2000" kern="1200">
-                <a:solidFill>
-                  <a:schemeClr val="tx1"/>
-                </a:solidFill>
-                <a:latin typeface="+mn-lt"/>
-                <a:ea typeface="+mn-ea"/>
-                <a:cs typeface="+mn-cs"/>
-              </a:defRPr>
-            </a:lvl3pPr>
-            <a:lvl4pPr marL="1600200" indent="-228600" algn="l" defTabSz="914400" rtl="0" eaLnBrk="1" latinLnBrk="0" hangingPunct="1">
-              <a:lnSpc>
-                <a:spcPct val="90000"/>
-              </a:lnSpc>
-              <a:spcBef>
-                <a:spcPts val="500"/>
-              </a:spcBef>
-              <a:buFont typeface="Arial"/>
-              <a:buChar char="•"/>
-              <a:defRPr sz="1800" kern="1200">
-                <a:solidFill>
-                  <a:schemeClr val="tx1"/>
-                </a:solidFill>
-                <a:latin typeface="+mn-lt"/>
-                <a:ea typeface="+mn-ea"/>
-                <a:cs typeface="+mn-cs"/>
-              </a:defRPr>
-            </a:lvl4pPr>
-            <a:lvl5pPr marL="2057400" indent="-228600" algn="l" defTabSz="914400" rtl="0" eaLnBrk="1" latinLnBrk="0" hangingPunct="1">
-              <a:lnSpc>
-                <a:spcPct val="90000"/>
-              </a:lnSpc>
-              <a:spcBef>
-                <a:spcPts val="500"/>
-              </a:spcBef>
-              <a:buFont typeface="Arial"/>
-              <a:buChar char="•"/>
-              <a:defRPr sz="1800" kern="1200">
-                <a:solidFill>
-                  <a:schemeClr val="tx1"/>
-                </a:solidFill>
-                <a:latin typeface="+mn-lt"/>
-                <a:ea typeface="+mn-ea"/>
-                <a:cs typeface="+mn-cs"/>
-              </a:defRPr>
-            </a:lvl5pPr>
-            <a:lvl6pPr marL="2514600" indent="-228600" algn="l" defTabSz="914400" rtl="0" eaLnBrk="1" latinLnBrk="0" hangingPunct="1">
-              <a:lnSpc>
-                <a:spcPct val="90000"/>
-              </a:lnSpc>
-              <a:spcBef>
-                <a:spcPts val="500"/>
-              </a:spcBef>
-              <a:buFont typeface="Arial"/>
-              <a:buChar char="•"/>
-              <a:defRPr sz="1800" kern="1200">
-                <a:solidFill>
-                  <a:schemeClr val="tx1"/>
-                </a:solidFill>
-                <a:latin typeface="+mn-lt"/>
-                <a:ea typeface="+mn-ea"/>
-                <a:cs typeface="+mn-cs"/>
-              </a:defRPr>
-            </a:lvl6pPr>
-            <a:lvl7pPr marL="2971800" indent="-228600" algn="l" defTabSz="914400" rtl="0" eaLnBrk="1" latinLnBrk="0" hangingPunct="1">
-              <a:lnSpc>
-                <a:spcPct val="90000"/>
-              </a:lnSpc>
-              <a:spcBef>
-                <a:spcPts val="500"/>
-              </a:spcBef>
-              <a:buFont typeface="Arial"/>
-              <a:buChar char="•"/>
-              <a:defRPr sz="1800" kern="1200">
-                <a:solidFill>
-                  <a:schemeClr val="tx1"/>
-                </a:solidFill>
-                <a:latin typeface="+mn-lt"/>
-                <a:ea typeface="+mn-ea"/>
-                <a:cs typeface="+mn-cs"/>
-              </a:defRPr>
-            </a:lvl7pPr>
-            <a:lvl8pPr marL="3429000" indent="-228600" algn="l" defTabSz="914400" rtl="0" eaLnBrk="1" latinLnBrk="0" hangingPunct="1">
-              <a:lnSpc>
-                <a:spcPct val="90000"/>
-              </a:lnSpc>
-              <a:spcBef>
-                <a:spcPts val="500"/>
-              </a:spcBef>
-              <a:buFont typeface="Arial"/>
-              <a:buChar char="•"/>
-              <a:defRPr sz="1800" kern="1200">
-                <a:solidFill>
-                  <a:schemeClr val="tx1"/>
-                </a:solidFill>
-                <a:latin typeface="+mn-lt"/>
-                <a:ea typeface="+mn-ea"/>
-                <a:cs typeface="+mn-cs"/>
-              </a:defRPr>
-            </a:lvl8pPr>
-            <a:lvl9pPr marL="3886200" indent="-228600" algn="l" defTabSz="914400" rtl="0" eaLnBrk="1" latinLnBrk="0" hangingPunct="1">
-              <a:lnSpc>
-                <a:spcPct val="90000"/>
-              </a:lnSpc>
-              <a:spcBef>
-                <a:spcPts val="500"/>
-              </a:spcBef>
-              <a:buFont typeface="Arial"/>
-              <a:buChar char="•"/>
-              <a:defRPr sz="1800" kern="1200">
-                <a:solidFill>
-                  <a:schemeClr val="tx1"/>
-                </a:solidFill>
-                <a:latin typeface="+mn-lt"/>
-                <a:ea typeface="+mn-ea"/>
-                <a:cs typeface="+mn-cs"/>
-              </a:defRPr>
-            </a:lvl9pPr>
-          </a:lstStyle>
-          <a:p>
-            <a:pPr marL="0" indent="0">
-              <a:lnSpc>
-                <a:spcPct val="100000"/>
-              </a:lnSpc>
-              <a:buNone/>
-            </a:pPr>
-            <a:endParaRPr lang="en-US" sz="2000" dirty="0"/>
-          </a:p>
-        </p:txBody>
-      </p:sp>
-      <p:pic>
-        <p:nvPicPr>
-          <p:cNvPr id="3" name="Picture 2"/>
-          <p:cNvPicPr>
-            <a:picLocks noChangeAspect="1"/>
-          </p:cNvPicPr>
-          <p:nvPr/>
-        </p:nvPicPr>
-        <p:blipFill>
-          <a:blip r:embed="rId2">
-            <a:extLst>
-              <a:ext uri="{28A0092B-C50C-407E-A947-70E740481C1C}">
-                <a14:useLocalDpi xmlns:a14="http://schemas.microsoft.com/office/drawing/2010/main" val="0"/>
-              </a:ext>
-            </a:extLst>
-          </a:blip>
-          <a:stretch>
-            <a:fillRect/>
-          </a:stretch>
-        </p:blipFill>
-        <p:spPr>
-          <a:xfrm>
-            <a:off x="1374531" y="881101"/>
-            <a:ext cx="9442938" cy="5633050"/>
-          </a:xfrm>
-          <a:prstGeom prst="rect">
-            <a:avLst/>
-          </a:prstGeom>
-        </p:spPr>
-      </p:pic>
-      <p:sp>
-        <p:nvSpPr>
-          <p:cNvPr id="5" name="Rectangle 4"/>
-          <p:cNvSpPr/>
-          <p:nvPr/>
-        </p:nvSpPr>
-        <p:spPr>
-          <a:xfrm>
-            <a:off x="8311662" y="1008183"/>
-            <a:ext cx="2555630" cy="2543909"/>
-          </a:xfrm>
-          <a:prstGeom prst="rect">
-            <a:avLst/>
-          </a:prstGeom>
-          <a:noFill/>
-          <a:ln w="19050">
-            <a:prstDash val="solid"/>
-          </a:ln>
-        </p:spPr>
-        <p:style>
-          <a:lnRef idx="2">
-            <a:schemeClr val="accent1">
-              <a:shade val="50000"/>
-            </a:schemeClr>
-          </a:lnRef>
-          <a:fillRef idx="1">
-            <a:schemeClr val="accent1"/>
-          </a:fillRef>
-          <a:effectRef idx="0">
-            <a:schemeClr val="accent1"/>
-          </a:effectRef>
-          <a:fontRef idx="minor">
-            <a:schemeClr val="lt1"/>
-          </a:fontRef>
-        </p:style>
-        <p:txBody>
-          <a:bodyPr rtlCol="0" anchor="ctr"/>
-          <a:lstStyle/>
-          <a:p>
-            <a:pPr algn="ctr"/>
-            <a:endParaRPr lang="en-US"/>
-          </a:p>
-        </p:txBody>
-      </p:sp>
-      <p:sp>
-        <p:nvSpPr>
-          <p:cNvPr id="6" name="TextBox 5"/>
-          <p:cNvSpPr txBox="1"/>
-          <p:nvPr/>
-        </p:nvSpPr>
-        <p:spPr>
-          <a:xfrm>
-            <a:off x="9036120" y="660547"/>
-            <a:ext cx="1106713" cy="307777"/>
-          </a:xfrm>
-          <a:prstGeom prst="rect">
-            <a:avLst/>
-          </a:prstGeom>
-          <a:noFill/>
-        </p:spPr>
-        <p:txBody>
-          <a:bodyPr wrap="none" rtlCol="0">
-            <a:spAutoFit/>
-          </a:bodyPr>
-          <a:lstStyle/>
-          <a:p>
-            <a:r>
-              <a:rPr lang="en-US" sz="1400" dirty="0" smtClean="0"/>
-              <a:t>Rule &amp; Atom</a:t>
-            </a:r>
-            <a:endParaRPr lang="en-US" sz="1400" dirty="0"/>
-          </a:p>
-        </p:txBody>
-      </p:sp>
-      <p:sp>
-        <p:nvSpPr>
-          <p:cNvPr id="8" name="Rectangle 7"/>
-          <p:cNvSpPr/>
-          <p:nvPr/>
-        </p:nvSpPr>
-        <p:spPr>
-          <a:xfrm>
-            <a:off x="3077308" y="968325"/>
-            <a:ext cx="3043604" cy="3199230"/>
-          </a:xfrm>
-          <a:prstGeom prst="rect">
-            <a:avLst/>
-          </a:prstGeom>
-          <a:noFill/>
-          <a:ln w="19050">
-            <a:solidFill>
-              <a:schemeClr val="tx2"/>
-            </a:solidFill>
-            <a:prstDash val="solid"/>
-          </a:ln>
-        </p:spPr>
-        <p:style>
-          <a:lnRef idx="2">
-            <a:schemeClr val="accent1">
-              <a:shade val="50000"/>
-            </a:schemeClr>
-          </a:lnRef>
-          <a:fillRef idx="1">
-            <a:schemeClr val="accent1"/>
-          </a:fillRef>
-          <a:effectRef idx="0">
-            <a:schemeClr val="accent1"/>
-          </a:effectRef>
-          <a:fontRef idx="minor">
-            <a:schemeClr val="lt1"/>
-          </a:fontRef>
-        </p:style>
-        <p:txBody>
-          <a:bodyPr rtlCol="0" anchor="ctr"/>
-          <a:lstStyle/>
-          <a:p>
-            <a:pPr algn="ctr"/>
-            <a:endParaRPr lang="en-US"/>
-          </a:p>
-        </p:txBody>
-      </p:sp>
-      <p:sp>
-        <p:nvSpPr>
-          <p:cNvPr id="9" name="TextBox 8"/>
-          <p:cNvSpPr txBox="1"/>
-          <p:nvPr/>
-        </p:nvSpPr>
-        <p:spPr>
-          <a:xfrm>
-            <a:off x="2238267" y="1909371"/>
-            <a:ext cx="705065" cy="307777"/>
-          </a:xfrm>
-          <a:prstGeom prst="rect">
-            <a:avLst/>
-          </a:prstGeom>
-          <a:noFill/>
-        </p:spPr>
-        <p:txBody>
-          <a:bodyPr wrap="none" rtlCol="0">
-            <a:spAutoFit/>
-          </a:bodyPr>
-          <a:lstStyle/>
-          <a:p>
-            <a:r>
-              <a:rPr lang="en-US" sz="1400" dirty="0" smtClean="0"/>
-              <a:t>Patient</a:t>
-            </a:r>
-            <a:endParaRPr lang="en-US" sz="1400" dirty="0"/>
-          </a:p>
-        </p:txBody>
-      </p:sp>
-      <p:sp>
-        <p:nvSpPr>
-          <p:cNvPr id="10" name="Rectangle 9"/>
-          <p:cNvSpPr/>
-          <p:nvPr/>
-        </p:nvSpPr>
-        <p:spPr>
-          <a:xfrm>
-            <a:off x="3229708" y="4468115"/>
-            <a:ext cx="2891204" cy="1797870"/>
-          </a:xfrm>
-          <a:prstGeom prst="rect">
-            <a:avLst/>
-          </a:prstGeom>
-          <a:noFill/>
-          <a:ln w="19050">
-            <a:solidFill>
-              <a:srgbClr val="FFC000"/>
-            </a:solidFill>
-            <a:prstDash val="solid"/>
-          </a:ln>
-        </p:spPr>
-        <p:style>
-          <a:lnRef idx="2">
-            <a:schemeClr val="accent1">
-              <a:shade val="50000"/>
-            </a:schemeClr>
-          </a:lnRef>
-          <a:fillRef idx="1">
-            <a:schemeClr val="accent1"/>
-          </a:fillRef>
-          <a:effectRef idx="0">
-            <a:schemeClr val="accent1"/>
-          </a:effectRef>
-          <a:fontRef idx="minor">
-            <a:schemeClr val="lt1"/>
-          </a:fontRef>
-        </p:style>
-        <p:txBody>
-          <a:bodyPr rtlCol="0" anchor="ctr"/>
-          <a:lstStyle/>
-          <a:p>
-            <a:pPr algn="ctr"/>
-            <a:endParaRPr lang="en-US"/>
-          </a:p>
-        </p:txBody>
-      </p:sp>
-      <p:sp>
-        <p:nvSpPr>
-          <p:cNvPr id="11" name="TextBox 10"/>
-          <p:cNvSpPr txBox="1"/>
-          <p:nvPr/>
-        </p:nvSpPr>
-        <p:spPr>
-          <a:xfrm>
-            <a:off x="4268948" y="6258768"/>
-            <a:ext cx="812723" cy="307777"/>
-          </a:xfrm>
-          <a:prstGeom prst="rect">
-            <a:avLst/>
-          </a:prstGeom>
-          <a:noFill/>
-        </p:spPr>
-        <p:txBody>
-          <a:bodyPr wrap="none" rtlCol="0">
-            <a:spAutoFit/>
-          </a:bodyPr>
-          <a:lstStyle/>
-          <a:p>
-            <a:r>
-              <a:rPr lang="en-US" sz="1400" dirty="0" err="1" smtClean="0"/>
-              <a:t>TestItem</a:t>
-            </a:r>
-            <a:endParaRPr lang="en-US" sz="1400" dirty="0"/>
-          </a:p>
-        </p:txBody>
-      </p:sp>
-      <p:sp>
-        <p:nvSpPr>
-          <p:cNvPr id="12" name="Rectangle 11"/>
-          <p:cNvSpPr/>
-          <p:nvPr/>
-        </p:nvSpPr>
-        <p:spPr>
-          <a:xfrm>
-            <a:off x="6836735" y="1199057"/>
-            <a:ext cx="1313121" cy="1779423"/>
-          </a:xfrm>
-          <a:prstGeom prst="rect">
-            <a:avLst/>
-          </a:prstGeom>
-          <a:noFill/>
-          <a:ln w="19050">
-            <a:prstDash val="dash"/>
-          </a:ln>
-        </p:spPr>
-        <p:style>
-          <a:lnRef idx="2">
-            <a:schemeClr val="accent1">
-              <a:shade val="50000"/>
-            </a:schemeClr>
-          </a:lnRef>
-          <a:fillRef idx="1">
-            <a:schemeClr val="accent1"/>
-          </a:fillRef>
-          <a:effectRef idx="0">
-            <a:schemeClr val="accent1"/>
-          </a:effectRef>
-          <a:fontRef idx="minor">
-            <a:schemeClr val="lt1"/>
-          </a:fontRef>
-        </p:style>
-        <p:txBody>
-          <a:bodyPr rtlCol="0" anchor="ctr"/>
-          <a:lstStyle/>
-          <a:p>
-            <a:pPr algn="ctr"/>
-            <a:endParaRPr lang="en-US"/>
-          </a:p>
-        </p:txBody>
-      </p:sp>
-      <p:sp>
-        <p:nvSpPr>
-          <p:cNvPr id="14" name="TextBox 13"/>
-          <p:cNvSpPr txBox="1"/>
-          <p:nvPr/>
-        </p:nvSpPr>
-        <p:spPr>
-          <a:xfrm>
-            <a:off x="6970570" y="894889"/>
-            <a:ext cx="853119" cy="307777"/>
-          </a:xfrm>
-          <a:prstGeom prst="rect">
-            <a:avLst/>
-          </a:prstGeom>
-          <a:noFill/>
-        </p:spPr>
-        <p:txBody>
-          <a:bodyPr wrap="none" rtlCol="0">
-            <a:spAutoFit/>
-          </a:bodyPr>
-          <a:lstStyle/>
-          <a:p>
-            <a:r>
-              <a:rPr lang="en-US" sz="1400" dirty="0" smtClean="0"/>
-              <a:t>Ontology</a:t>
-            </a:r>
-            <a:endParaRPr lang="en-US" sz="1400" dirty="0"/>
-          </a:p>
-        </p:txBody>
-      </p:sp>
-    </p:spTree>
-    <p:extLst>
-      <p:ext uri="{BB962C8B-B14F-4D97-AF65-F5344CB8AC3E}">
-        <p14:creationId xmlns:p14="http://schemas.microsoft.com/office/powerpoint/2010/main" val="263511649"/>
       </p:ext>
     </p:extLst>
   </p:cSld>

</xml_diff>

<commit_message>
Issue : PPT와 UML 추가
</commit_message>
<xml_diff>
--- a/etc/pt/IKATool_151111_01.pptx
+++ b/etc/pt/IKATool_151111_01.pptx
@@ -5,22 +5,24 @@
     <p:sldMasterId id="2147483648" r:id="rId1"/>
   </p:sldMasterIdLst>
   <p:notesMasterIdLst>
-    <p:notesMasterId r:id="rId15"/>
+    <p:notesMasterId r:id="rId17"/>
   </p:notesMasterIdLst>
   <p:sldIdLst>
     <p:sldId id="257" r:id="rId2"/>
-    <p:sldId id="361" r:id="rId3"/>
-    <p:sldId id="358" r:id="rId4"/>
-    <p:sldId id="359" r:id="rId5"/>
-    <p:sldId id="360" r:id="rId6"/>
-    <p:sldId id="355" r:id="rId7"/>
-    <p:sldId id="356" r:id="rId8"/>
-    <p:sldId id="351" r:id="rId9"/>
-    <p:sldId id="346" r:id="rId10"/>
-    <p:sldId id="347" r:id="rId11"/>
-    <p:sldId id="348" r:id="rId12"/>
-    <p:sldId id="349" r:id="rId13"/>
-    <p:sldId id="357" r:id="rId14"/>
+    <p:sldId id="362" r:id="rId3"/>
+    <p:sldId id="363" r:id="rId4"/>
+    <p:sldId id="361" r:id="rId5"/>
+    <p:sldId id="358" r:id="rId6"/>
+    <p:sldId id="359" r:id="rId7"/>
+    <p:sldId id="360" r:id="rId8"/>
+    <p:sldId id="355" r:id="rId9"/>
+    <p:sldId id="356" r:id="rId10"/>
+    <p:sldId id="351" r:id="rId11"/>
+    <p:sldId id="346" r:id="rId12"/>
+    <p:sldId id="347" r:id="rId13"/>
+    <p:sldId id="348" r:id="rId14"/>
+    <p:sldId id="349" r:id="rId15"/>
+    <p:sldId id="357" r:id="rId16"/>
   </p:sldIdLst>
   <p:sldSz cx="12192000" cy="6858000"/>
   <p:notesSz cx="6858000" cy="9144000"/>
@@ -627,7 +629,7 @@
           <a:p>
             <a:fld id="{77EDDE2A-C972-BB4E-BAA3-29C1A6CCF3D5}" type="slidenum">
               <a:rPr lang="en-US" smtClean="0"/>
-              <a:t>13</a:t>
+              <a:t>15</a:t>
             </a:fld>
             <a:endParaRPr lang="en-US"/>
           </a:p>
@@ -4604,6 +4606,142 @@
       </p:grpSpPr>
       <p:sp>
         <p:nvSpPr>
+          <p:cNvPr id="2" name="Text Placeholder 1"/>
+          <p:cNvSpPr>
+            <a:spLocks noGrp="1"/>
+          </p:cNvSpPr>
+          <p:nvPr>
+            <p:ph type="body" sz="quarter" idx="11"/>
+          </p:nvPr>
+        </p:nvSpPr>
+        <p:spPr/>
+        <p:txBody>
+          <a:bodyPr/>
+          <a:lstStyle/>
+          <a:p>
+            <a:r>
+              <a:rPr lang="ko-KR" altLang="en-US" dirty="0" smtClean="0"/>
+              <a:t>이전 자료</a:t>
+            </a:r>
+            <a:endParaRPr lang="en-US" dirty="0"/>
+          </a:p>
+        </p:txBody>
+      </p:sp>
+      <p:sp>
+        <p:nvSpPr>
+          <p:cNvPr id="3" name="Text Placeholder 2"/>
+          <p:cNvSpPr>
+            <a:spLocks noGrp="1"/>
+          </p:cNvSpPr>
+          <p:nvPr>
+            <p:ph type="body" sz="quarter" idx="12"/>
+          </p:nvPr>
+        </p:nvSpPr>
+        <p:spPr/>
+        <p:txBody>
+          <a:bodyPr/>
+          <a:lstStyle/>
+          <a:p>
+            <a:endParaRPr lang="en-US"/>
+          </a:p>
+        </p:txBody>
+      </p:sp>
+      <p:sp>
+        <p:nvSpPr>
+          <p:cNvPr id="4" name="Text Placeholder 3"/>
+          <p:cNvSpPr>
+            <a:spLocks noGrp="1"/>
+          </p:cNvSpPr>
+          <p:nvPr>
+            <p:ph type="body" sz="quarter" idx="13"/>
+          </p:nvPr>
+        </p:nvSpPr>
+        <p:spPr/>
+        <p:txBody>
+          <a:bodyPr/>
+          <a:lstStyle/>
+          <a:p>
+            <a:endParaRPr lang="en-US"/>
+          </a:p>
+        </p:txBody>
+      </p:sp>
+      <p:sp>
+        <p:nvSpPr>
+          <p:cNvPr id="5" name="Text Placeholder 4"/>
+          <p:cNvSpPr>
+            <a:spLocks noGrp="1"/>
+          </p:cNvSpPr>
+          <p:nvPr>
+            <p:ph type="body" sz="quarter" idx="14"/>
+          </p:nvPr>
+        </p:nvSpPr>
+        <p:spPr/>
+        <p:txBody>
+          <a:bodyPr/>
+          <a:lstStyle/>
+          <a:p>
+            <a:endParaRPr lang="en-US"/>
+          </a:p>
+        </p:txBody>
+      </p:sp>
+      <p:sp>
+        <p:nvSpPr>
+          <p:cNvPr id="6" name="Title 5"/>
+          <p:cNvSpPr>
+            <a:spLocks noGrp="1"/>
+          </p:cNvSpPr>
+          <p:nvPr>
+            <p:ph type="title"/>
+          </p:nvPr>
+        </p:nvSpPr>
+        <p:spPr/>
+        <p:txBody>
+          <a:bodyPr/>
+          <a:lstStyle/>
+          <a:p>
+            <a:endParaRPr lang="en-US"/>
+          </a:p>
+        </p:txBody>
+      </p:sp>
+    </p:spTree>
+    <p:extLst>
+      <p:ext uri="{BB962C8B-B14F-4D97-AF65-F5344CB8AC3E}">
+        <p14:creationId xmlns:p14="http://schemas.microsoft.com/office/powerpoint/2010/main" val="1923305761"/>
+      </p:ext>
+    </p:extLst>
+  </p:cSld>
+  <p:clrMapOvr>
+    <a:masterClrMapping/>
+  </p:clrMapOvr>
+  <p:timing>
+    <p:tnLst>
+      <p:par>
+        <p:cTn id="1" dur="indefinite" restart="never" nodeType="tmRoot"/>
+      </p:par>
+    </p:tnLst>
+  </p:timing>
+</p:sld>
+</file>
+
+<file path=ppt/slides/slide11.xml><?xml version="1.0" encoding="utf-8"?>
+<p:sld xmlns:a="http://schemas.openxmlformats.org/drawingml/2006/main" xmlns:r="http://schemas.openxmlformats.org/officeDocument/2006/relationships" xmlns:p="http://schemas.openxmlformats.org/presentationml/2006/main">
+  <p:cSld>
+    <p:spTree>
+      <p:nvGrpSpPr>
+        <p:cNvPr id="1" name=""/>
+        <p:cNvGrpSpPr/>
+        <p:nvPr/>
+      </p:nvGrpSpPr>
+      <p:grpSpPr>
+        <a:xfrm>
+          <a:off x="0" y="0"/>
+          <a:ext cx="0" cy="0"/>
+          <a:chOff x="0" y="0"/>
+          <a:chExt cx="0" cy="0"/>
+        </a:xfrm>
+      </p:grpSpPr>
+      <p:sp>
+        <p:nvSpPr>
           <p:cNvPr id="2" name="제목 1"/>
           <p:cNvSpPr>
             <a:spLocks noGrp="1"/>
@@ -4619,19 +4757,11 @@
           <a:p>
             <a:r>
               <a:rPr lang="en-US" altLang="ko-KR" dirty="0" smtClean="0"/>
-              <a:t>Data</a:t>
+              <a:t>GUI </a:t>
             </a:r>
             <a:r>
               <a:rPr lang="ko-KR" altLang="en-US" dirty="0" smtClean="0"/>
-              <a:t>의 </a:t>
-            </a:r>
-            <a:r>
-              <a:rPr lang="en-US" altLang="ko-KR" dirty="0" smtClean="0"/>
-              <a:t>Class Diagram</a:t>
-            </a:r>
-            <a:r>
-              <a:rPr lang="ko-KR" altLang="en-US" dirty="0" smtClean="0"/>
-              <a:t> </a:t>
+              <a:t>가이드 라인 </a:t>
             </a:r>
             <a:r>
               <a:rPr lang="en-US" altLang="ko-KR" dirty="0" err="1" smtClean="0"/>
@@ -4841,7 +4971,7 @@
       </p:sp>
       <p:pic>
         <p:nvPicPr>
-          <p:cNvPr id="3" name="Picture 2"/>
+          <p:cNvPr id="13" name="Picture 12"/>
           <p:cNvPicPr>
             <a:picLocks noChangeAspect="1"/>
           </p:cNvPicPr>
@@ -4861,8 +4991,8 @@
         </p:blipFill>
         <p:spPr>
           <a:xfrm>
-            <a:off x="1374531" y="881101"/>
-            <a:ext cx="9442938" cy="5633050"/>
+            <a:off x="1998787" y="1773620"/>
+            <a:ext cx="8745414" cy="4548650"/>
           </a:xfrm>
           <a:prstGeom prst="rect">
             <a:avLst/>
@@ -4871,58 +5001,14 @@
       </p:pic>
       <p:sp>
         <p:nvSpPr>
-          <p:cNvPr id="5" name="Rectangle 4"/>
-          <p:cNvSpPr/>
+          <p:cNvPr id="15" name="TextBox 14"/>
+          <p:cNvSpPr txBox="1"/>
           <p:nvPr/>
         </p:nvSpPr>
         <p:spPr>
           <a:xfrm>
-            <a:off x="8311662" y="1008183"/>
-            <a:ext cx="2555630" cy="2543909"/>
-          </a:xfrm>
-          <a:prstGeom prst="rect">
-            <a:avLst/>
-          </a:prstGeom>
-          <a:noFill/>
-          <a:ln w="19050">
-            <a:prstDash val="solid"/>
-          </a:ln>
-        </p:spPr>
-        <p:style>
-          <a:lnRef idx="2">
-            <a:schemeClr val="accent1">
-              <a:shade val="50000"/>
-            </a:schemeClr>
-          </a:lnRef>
-          <a:fillRef idx="1">
-            <a:schemeClr val="accent1"/>
-          </a:fillRef>
-          <a:effectRef idx="0">
-            <a:schemeClr val="accent1"/>
-          </a:effectRef>
-          <a:fontRef idx="minor">
-            <a:schemeClr val="lt1"/>
-          </a:fontRef>
-        </p:style>
-        <p:txBody>
-          <a:bodyPr rtlCol="0" anchor="ctr"/>
-          <a:lstStyle/>
-          <a:p>
-            <a:pPr algn="ctr"/>
-            <a:endParaRPr lang="en-US"/>
-          </a:p>
-        </p:txBody>
-      </p:sp>
-      <p:sp>
-        <p:nvSpPr>
-          <p:cNvPr id="6" name="TextBox 5"/>
-          <p:cNvSpPr txBox="1"/>
-          <p:nvPr/>
-        </p:nvSpPr>
-        <p:spPr>
-          <a:xfrm>
-            <a:off x="9036120" y="660547"/>
-            <a:ext cx="1106713" cy="307777"/>
+            <a:off x="838200" y="1325213"/>
+            <a:ext cx="6152646" cy="369332"/>
           </a:xfrm>
           <a:prstGeom prst="rect">
             <a:avLst/>
@@ -4935,246 +5021,22 @@
           </a:bodyPr>
           <a:lstStyle/>
           <a:p>
-            <a:r>
-              <a:rPr lang="en-US" sz="1400" dirty="0" smtClean="0"/>
-              <a:t>Rule &amp; Atom</a:t>
-            </a:r>
-            <a:endParaRPr lang="en-US" sz="1400" dirty="0"/>
-          </a:p>
-        </p:txBody>
-      </p:sp>
-      <p:sp>
-        <p:nvSpPr>
-          <p:cNvPr id="8" name="Rectangle 7"/>
-          <p:cNvSpPr/>
-          <p:nvPr/>
-        </p:nvSpPr>
-        <p:spPr>
-          <a:xfrm>
-            <a:off x="3077308" y="968325"/>
-            <a:ext cx="3043604" cy="3199230"/>
-          </a:xfrm>
-          <a:prstGeom prst="rect">
-            <a:avLst/>
-          </a:prstGeom>
-          <a:noFill/>
-          <a:ln w="19050">
-            <a:solidFill>
-              <a:schemeClr val="tx2"/>
-            </a:solidFill>
-            <a:prstDash val="solid"/>
-          </a:ln>
-        </p:spPr>
-        <p:style>
-          <a:lnRef idx="2">
-            <a:schemeClr val="accent1">
-              <a:shade val="50000"/>
-            </a:schemeClr>
-          </a:lnRef>
-          <a:fillRef idx="1">
-            <a:schemeClr val="accent1"/>
-          </a:fillRef>
-          <a:effectRef idx="0">
-            <a:schemeClr val="accent1"/>
-          </a:effectRef>
-          <a:fontRef idx="minor">
-            <a:schemeClr val="lt1"/>
-          </a:fontRef>
-        </p:style>
-        <p:txBody>
-          <a:bodyPr rtlCol="0" anchor="ctr"/>
-          <a:lstStyle/>
-          <a:p>
-            <a:pPr algn="ctr"/>
-            <a:endParaRPr lang="en-US"/>
-          </a:p>
-        </p:txBody>
-      </p:sp>
-      <p:sp>
-        <p:nvSpPr>
-          <p:cNvPr id="9" name="TextBox 8"/>
-          <p:cNvSpPr txBox="1"/>
-          <p:nvPr/>
-        </p:nvSpPr>
-        <p:spPr>
-          <a:xfrm>
-            <a:off x="2238267" y="1909371"/>
-            <a:ext cx="705065" cy="307777"/>
-          </a:xfrm>
-          <a:prstGeom prst="rect">
-            <a:avLst/>
-          </a:prstGeom>
-          <a:noFill/>
-        </p:spPr>
-        <p:txBody>
-          <a:bodyPr wrap="none" rtlCol="0">
-            <a:spAutoFit/>
-          </a:bodyPr>
-          <a:lstStyle/>
-          <a:p>
-            <a:r>
-              <a:rPr lang="en-US" sz="1400" dirty="0" smtClean="0"/>
-              <a:t>Patient</a:t>
-            </a:r>
-            <a:endParaRPr lang="en-US" sz="1400" dirty="0"/>
-          </a:p>
-        </p:txBody>
-      </p:sp>
-      <p:sp>
-        <p:nvSpPr>
-          <p:cNvPr id="10" name="Rectangle 9"/>
-          <p:cNvSpPr/>
-          <p:nvPr/>
-        </p:nvSpPr>
-        <p:spPr>
-          <a:xfrm>
-            <a:off x="3229708" y="4468115"/>
-            <a:ext cx="2891204" cy="1797870"/>
-          </a:xfrm>
-          <a:prstGeom prst="rect">
-            <a:avLst/>
-          </a:prstGeom>
-          <a:noFill/>
-          <a:ln w="19050">
-            <a:solidFill>
-              <a:srgbClr val="FFC000"/>
-            </a:solidFill>
-            <a:prstDash val="solid"/>
-          </a:ln>
-        </p:spPr>
-        <p:style>
-          <a:lnRef idx="2">
-            <a:schemeClr val="accent1">
-              <a:shade val="50000"/>
-            </a:schemeClr>
-          </a:lnRef>
-          <a:fillRef idx="1">
-            <a:schemeClr val="accent1"/>
-          </a:fillRef>
-          <a:effectRef idx="0">
-            <a:schemeClr val="accent1"/>
-          </a:effectRef>
-          <a:fontRef idx="minor">
-            <a:schemeClr val="lt1"/>
-          </a:fontRef>
-        </p:style>
-        <p:txBody>
-          <a:bodyPr rtlCol="0" anchor="ctr"/>
-          <a:lstStyle/>
-          <a:p>
-            <a:pPr algn="ctr"/>
-            <a:endParaRPr lang="en-US"/>
-          </a:p>
-        </p:txBody>
-      </p:sp>
-      <p:sp>
-        <p:nvSpPr>
-          <p:cNvPr id="11" name="TextBox 10"/>
-          <p:cNvSpPr txBox="1"/>
-          <p:nvPr/>
-        </p:nvSpPr>
-        <p:spPr>
-          <a:xfrm>
-            <a:off x="4268948" y="6258768"/>
-            <a:ext cx="812723" cy="307777"/>
-          </a:xfrm>
-          <a:prstGeom prst="rect">
-            <a:avLst/>
-          </a:prstGeom>
-          <a:noFill/>
-        </p:spPr>
-        <p:txBody>
-          <a:bodyPr wrap="none" rtlCol="0">
-            <a:spAutoFit/>
-          </a:bodyPr>
-          <a:lstStyle/>
-          <a:p>
-            <a:r>
-              <a:rPr lang="en-US" sz="1400" dirty="0" err="1" smtClean="0"/>
-              <a:t>TestItem</a:t>
-            </a:r>
-            <a:endParaRPr lang="en-US" sz="1400" dirty="0"/>
-          </a:p>
-        </p:txBody>
-      </p:sp>
-      <p:sp>
-        <p:nvSpPr>
-          <p:cNvPr id="12" name="Rectangle 11"/>
-          <p:cNvSpPr/>
-          <p:nvPr/>
-        </p:nvSpPr>
-        <p:spPr>
-          <a:xfrm>
-            <a:off x="6836735" y="1199057"/>
-            <a:ext cx="1313121" cy="1779423"/>
-          </a:xfrm>
-          <a:prstGeom prst="rect">
-            <a:avLst/>
-          </a:prstGeom>
-          <a:noFill/>
-          <a:ln w="19050">
-            <a:prstDash val="dash"/>
-          </a:ln>
-        </p:spPr>
-        <p:style>
-          <a:lnRef idx="2">
-            <a:schemeClr val="accent1">
-              <a:shade val="50000"/>
-            </a:schemeClr>
-          </a:lnRef>
-          <a:fillRef idx="1">
-            <a:schemeClr val="accent1"/>
-          </a:fillRef>
-          <a:effectRef idx="0">
-            <a:schemeClr val="accent1"/>
-          </a:effectRef>
-          <a:fontRef idx="minor">
-            <a:schemeClr val="lt1"/>
-          </a:fontRef>
-        </p:style>
-        <p:txBody>
-          <a:bodyPr rtlCol="0" anchor="ctr"/>
-          <a:lstStyle/>
-          <a:p>
-            <a:pPr algn="ctr"/>
-            <a:endParaRPr lang="en-US"/>
-          </a:p>
-        </p:txBody>
-      </p:sp>
-      <p:sp>
-        <p:nvSpPr>
-          <p:cNvPr id="14" name="TextBox 13"/>
-          <p:cNvSpPr txBox="1"/>
-          <p:nvPr/>
-        </p:nvSpPr>
-        <p:spPr>
-          <a:xfrm>
-            <a:off x="6970570" y="894889"/>
-            <a:ext cx="853119" cy="307777"/>
-          </a:xfrm>
-          <a:prstGeom prst="rect">
-            <a:avLst/>
-          </a:prstGeom>
-          <a:noFill/>
-        </p:spPr>
-        <p:txBody>
-          <a:bodyPr wrap="none" rtlCol="0">
-            <a:spAutoFit/>
-          </a:bodyPr>
-          <a:lstStyle/>
-          <a:p>
-            <a:r>
-              <a:rPr lang="en-US" sz="1400" dirty="0" smtClean="0"/>
-              <a:t>Ontology</a:t>
-            </a:r>
-            <a:endParaRPr lang="en-US" sz="1400" dirty="0"/>
+            <a:pPr marL="285750" indent="-285750">
+              <a:buFont typeface="Arial" charset="0"/>
+              <a:buChar char="•"/>
+            </a:pPr>
+            <a:r>
+              <a:rPr lang="ko-KR" altLang="en-US" smtClean="0"/>
+              <a:t>기능적 가이드 라인이기 때문에 사용 편의성이 높지 않음</a:t>
+            </a:r>
+            <a:endParaRPr lang="en-US" dirty="0"/>
           </a:p>
         </p:txBody>
       </p:sp>
     </p:spTree>
     <p:extLst>
       <p:ext uri="{BB962C8B-B14F-4D97-AF65-F5344CB8AC3E}">
-        <p14:creationId xmlns:p14="http://schemas.microsoft.com/office/powerpoint/2010/main" val="263511649"/>
+        <p14:creationId xmlns:p14="http://schemas.microsoft.com/office/powerpoint/2010/main" val="318561886"/>
       </p:ext>
     </p:extLst>
   </p:cSld>
@@ -5191,7 +5053,7 @@
 </p:sld>
 </file>
 
-<file path=ppt/slides/slide11.xml><?xml version="1.0" encoding="utf-8"?>
+<file path=ppt/slides/slide12.xml><?xml version="1.0" encoding="utf-8"?>
 <p:sld xmlns:a="http://schemas.openxmlformats.org/drawingml/2006/main" xmlns:r="http://schemas.openxmlformats.org/officeDocument/2006/relationships" xmlns:p="http://schemas.openxmlformats.org/presentationml/2006/main">
   <p:cSld>
     <p:spTree>
@@ -5225,7 +5087,27 @@
           <a:p>
             <a:r>
               <a:rPr lang="en-US" altLang="ko-KR" dirty="0" smtClean="0"/>
-              <a:t>GUI Goal</a:t>
+              <a:t>Data</a:t>
+            </a:r>
+            <a:r>
+              <a:rPr lang="ko-KR" altLang="en-US" dirty="0" smtClean="0"/>
+              <a:t>의 </a:t>
+            </a:r>
+            <a:r>
+              <a:rPr lang="en-US" altLang="ko-KR" dirty="0" smtClean="0"/>
+              <a:t>Class Diagram</a:t>
+            </a:r>
+            <a:r>
+              <a:rPr lang="ko-KR" altLang="en-US" dirty="0" smtClean="0"/>
+              <a:t> </a:t>
+            </a:r>
+            <a:r>
+              <a:rPr lang="en-US" altLang="ko-KR" dirty="0" err="1" smtClean="0"/>
+              <a:t>Ver</a:t>
+            </a:r>
+            <a:r>
+              <a:rPr lang="en-US" altLang="ko-KR" dirty="0" smtClean="0"/>
+              <a:t> 0.1</a:t>
             </a:r>
             <a:endParaRPr lang="ko-KR" altLang="en-US" dirty="0"/>
           </a:p>
@@ -5425,6 +5307,592 @@
           </a:p>
         </p:txBody>
       </p:sp>
+      <p:pic>
+        <p:nvPicPr>
+          <p:cNvPr id="3" name="Picture 2"/>
+          <p:cNvPicPr>
+            <a:picLocks noChangeAspect="1"/>
+          </p:cNvPicPr>
+          <p:nvPr/>
+        </p:nvPicPr>
+        <p:blipFill>
+          <a:blip r:embed="rId2">
+            <a:extLst>
+              <a:ext uri="{28A0092B-C50C-407E-A947-70E740481C1C}">
+                <a14:useLocalDpi xmlns:a14="http://schemas.microsoft.com/office/drawing/2010/main" val="0"/>
+              </a:ext>
+            </a:extLst>
+          </a:blip>
+          <a:stretch>
+            <a:fillRect/>
+          </a:stretch>
+        </p:blipFill>
+        <p:spPr>
+          <a:xfrm>
+            <a:off x="1374531" y="881101"/>
+            <a:ext cx="9442938" cy="5633050"/>
+          </a:xfrm>
+          <a:prstGeom prst="rect">
+            <a:avLst/>
+          </a:prstGeom>
+        </p:spPr>
+      </p:pic>
+      <p:sp>
+        <p:nvSpPr>
+          <p:cNvPr id="5" name="Rectangle 4"/>
+          <p:cNvSpPr/>
+          <p:nvPr/>
+        </p:nvSpPr>
+        <p:spPr>
+          <a:xfrm>
+            <a:off x="8311662" y="1008183"/>
+            <a:ext cx="2555630" cy="2543909"/>
+          </a:xfrm>
+          <a:prstGeom prst="rect">
+            <a:avLst/>
+          </a:prstGeom>
+          <a:noFill/>
+          <a:ln w="19050">
+            <a:prstDash val="solid"/>
+          </a:ln>
+        </p:spPr>
+        <p:style>
+          <a:lnRef idx="2">
+            <a:schemeClr val="accent1">
+              <a:shade val="50000"/>
+            </a:schemeClr>
+          </a:lnRef>
+          <a:fillRef idx="1">
+            <a:schemeClr val="accent1"/>
+          </a:fillRef>
+          <a:effectRef idx="0">
+            <a:schemeClr val="accent1"/>
+          </a:effectRef>
+          <a:fontRef idx="minor">
+            <a:schemeClr val="lt1"/>
+          </a:fontRef>
+        </p:style>
+        <p:txBody>
+          <a:bodyPr rtlCol="0" anchor="ctr"/>
+          <a:lstStyle/>
+          <a:p>
+            <a:pPr algn="ctr"/>
+            <a:endParaRPr lang="en-US"/>
+          </a:p>
+        </p:txBody>
+      </p:sp>
+      <p:sp>
+        <p:nvSpPr>
+          <p:cNvPr id="6" name="TextBox 5"/>
+          <p:cNvSpPr txBox="1"/>
+          <p:nvPr/>
+        </p:nvSpPr>
+        <p:spPr>
+          <a:xfrm>
+            <a:off x="9036120" y="660547"/>
+            <a:ext cx="1106713" cy="307777"/>
+          </a:xfrm>
+          <a:prstGeom prst="rect">
+            <a:avLst/>
+          </a:prstGeom>
+          <a:noFill/>
+        </p:spPr>
+        <p:txBody>
+          <a:bodyPr wrap="none" rtlCol="0">
+            <a:spAutoFit/>
+          </a:bodyPr>
+          <a:lstStyle/>
+          <a:p>
+            <a:r>
+              <a:rPr lang="en-US" sz="1400" dirty="0" smtClean="0"/>
+              <a:t>Rule &amp; Atom</a:t>
+            </a:r>
+            <a:endParaRPr lang="en-US" sz="1400" dirty="0"/>
+          </a:p>
+        </p:txBody>
+      </p:sp>
+      <p:sp>
+        <p:nvSpPr>
+          <p:cNvPr id="8" name="Rectangle 7"/>
+          <p:cNvSpPr/>
+          <p:nvPr/>
+        </p:nvSpPr>
+        <p:spPr>
+          <a:xfrm>
+            <a:off x="3077308" y="968325"/>
+            <a:ext cx="3043604" cy="3199230"/>
+          </a:xfrm>
+          <a:prstGeom prst="rect">
+            <a:avLst/>
+          </a:prstGeom>
+          <a:noFill/>
+          <a:ln w="19050">
+            <a:solidFill>
+              <a:schemeClr val="tx2"/>
+            </a:solidFill>
+            <a:prstDash val="solid"/>
+          </a:ln>
+        </p:spPr>
+        <p:style>
+          <a:lnRef idx="2">
+            <a:schemeClr val="accent1">
+              <a:shade val="50000"/>
+            </a:schemeClr>
+          </a:lnRef>
+          <a:fillRef idx="1">
+            <a:schemeClr val="accent1"/>
+          </a:fillRef>
+          <a:effectRef idx="0">
+            <a:schemeClr val="accent1"/>
+          </a:effectRef>
+          <a:fontRef idx="minor">
+            <a:schemeClr val="lt1"/>
+          </a:fontRef>
+        </p:style>
+        <p:txBody>
+          <a:bodyPr rtlCol="0" anchor="ctr"/>
+          <a:lstStyle/>
+          <a:p>
+            <a:pPr algn="ctr"/>
+            <a:endParaRPr lang="en-US"/>
+          </a:p>
+        </p:txBody>
+      </p:sp>
+      <p:sp>
+        <p:nvSpPr>
+          <p:cNvPr id="9" name="TextBox 8"/>
+          <p:cNvSpPr txBox="1"/>
+          <p:nvPr/>
+        </p:nvSpPr>
+        <p:spPr>
+          <a:xfrm>
+            <a:off x="2238267" y="1909371"/>
+            <a:ext cx="705065" cy="307777"/>
+          </a:xfrm>
+          <a:prstGeom prst="rect">
+            <a:avLst/>
+          </a:prstGeom>
+          <a:noFill/>
+        </p:spPr>
+        <p:txBody>
+          <a:bodyPr wrap="none" rtlCol="0">
+            <a:spAutoFit/>
+          </a:bodyPr>
+          <a:lstStyle/>
+          <a:p>
+            <a:r>
+              <a:rPr lang="en-US" sz="1400" dirty="0" smtClean="0"/>
+              <a:t>Patient</a:t>
+            </a:r>
+            <a:endParaRPr lang="en-US" sz="1400" dirty="0"/>
+          </a:p>
+        </p:txBody>
+      </p:sp>
+      <p:sp>
+        <p:nvSpPr>
+          <p:cNvPr id="10" name="Rectangle 9"/>
+          <p:cNvSpPr/>
+          <p:nvPr/>
+        </p:nvSpPr>
+        <p:spPr>
+          <a:xfrm>
+            <a:off x="3229708" y="4468115"/>
+            <a:ext cx="2891204" cy="1797870"/>
+          </a:xfrm>
+          <a:prstGeom prst="rect">
+            <a:avLst/>
+          </a:prstGeom>
+          <a:noFill/>
+          <a:ln w="19050">
+            <a:solidFill>
+              <a:srgbClr val="FFC000"/>
+            </a:solidFill>
+            <a:prstDash val="solid"/>
+          </a:ln>
+        </p:spPr>
+        <p:style>
+          <a:lnRef idx="2">
+            <a:schemeClr val="accent1">
+              <a:shade val="50000"/>
+            </a:schemeClr>
+          </a:lnRef>
+          <a:fillRef idx="1">
+            <a:schemeClr val="accent1"/>
+          </a:fillRef>
+          <a:effectRef idx="0">
+            <a:schemeClr val="accent1"/>
+          </a:effectRef>
+          <a:fontRef idx="minor">
+            <a:schemeClr val="lt1"/>
+          </a:fontRef>
+        </p:style>
+        <p:txBody>
+          <a:bodyPr rtlCol="0" anchor="ctr"/>
+          <a:lstStyle/>
+          <a:p>
+            <a:pPr algn="ctr"/>
+            <a:endParaRPr lang="en-US"/>
+          </a:p>
+        </p:txBody>
+      </p:sp>
+      <p:sp>
+        <p:nvSpPr>
+          <p:cNvPr id="11" name="TextBox 10"/>
+          <p:cNvSpPr txBox="1"/>
+          <p:nvPr/>
+        </p:nvSpPr>
+        <p:spPr>
+          <a:xfrm>
+            <a:off x="4268948" y="6258768"/>
+            <a:ext cx="812723" cy="307777"/>
+          </a:xfrm>
+          <a:prstGeom prst="rect">
+            <a:avLst/>
+          </a:prstGeom>
+          <a:noFill/>
+        </p:spPr>
+        <p:txBody>
+          <a:bodyPr wrap="none" rtlCol="0">
+            <a:spAutoFit/>
+          </a:bodyPr>
+          <a:lstStyle/>
+          <a:p>
+            <a:r>
+              <a:rPr lang="en-US" sz="1400" dirty="0" err="1" smtClean="0"/>
+              <a:t>TestItem</a:t>
+            </a:r>
+            <a:endParaRPr lang="en-US" sz="1400" dirty="0"/>
+          </a:p>
+        </p:txBody>
+      </p:sp>
+      <p:sp>
+        <p:nvSpPr>
+          <p:cNvPr id="12" name="Rectangle 11"/>
+          <p:cNvSpPr/>
+          <p:nvPr/>
+        </p:nvSpPr>
+        <p:spPr>
+          <a:xfrm>
+            <a:off x="6836735" y="1199057"/>
+            <a:ext cx="1313121" cy="1779423"/>
+          </a:xfrm>
+          <a:prstGeom prst="rect">
+            <a:avLst/>
+          </a:prstGeom>
+          <a:noFill/>
+          <a:ln w="19050">
+            <a:prstDash val="dash"/>
+          </a:ln>
+        </p:spPr>
+        <p:style>
+          <a:lnRef idx="2">
+            <a:schemeClr val="accent1">
+              <a:shade val="50000"/>
+            </a:schemeClr>
+          </a:lnRef>
+          <a:fillRef idx="1">
+            <a:schemeClr val="accent1"/>
+          </a:fillRef>
+          <a:effectRef idx="0">
+            <a:schemeClr val="accent1"/>
+          </a:effectRef>
+          <a:fontRef idx="minor">
+            <a:schemeClr val="lt1"/>
+          </a:fontRef>
+        </p:style>
+        <p:txBody>
+          <a:bodyPr rtlCol="0" anchor="ctr"/>
+          <a:lstStyle/>
+          <a:p>
+            <a:pPr algn="ctr"/>
+            <a:endParaRPr lang="en-US"/>
+          </a:p>
+        </p:txBody>
+      </p:sp>
+      <p:sp>
+        <p:nvSpPr>
+          <p:cNvPr id="14" name="TextBox 13"/>
+          <p:cNvSpPr txBox="1"/>
+          <p:nvPr/>
+        </p:nvSpPr>
+        <p:spPr>
+          <a:xfrm>
+            <a:off x="6970570" y="894889"/>
+            <a:ext cx="853119" cy="307777"/>
+          </a:xfrm>
+          <a:prstGeom prst="rect">
+            <a:avLst/>
+          </a:prstGeom>
+          <a:noFill/>
+        </p:spPr>
+        <p:txBody>
+          <a:bodyPr wrap="none" rtlCol="0">
+            <a:spAutoFit/>
+          </a:bodyPr>
+          <a:lstStyle/>
+          <a:p>
+            <a:r>
+              <a:rPr lang="en-US" sz="1400" dirty="0" smtClean="0"/>
+              <a:t>Ontology</a:t>
+            </a:r>
+            <a:endParaRPr lang="en-US" sz="1400" dirty="0"/>
+          </a:p>
+        </p:txBody>
+      </p:sp>
+    </p:spTree>
+    <p:extLst>
+      <p:ext uri="{BB962C8B-B14F-4D97-AF65-F5344CB8AC3E}">
+        <p14:creationId xmlns:p14="http://schemas.microsoft.com/office/powerpoint/2010/main" val="263511649"/>
+      </p:ext>
+    </p:extLst>
+  </p:cSld>
+  <p:clrMapOvr>
+    <a:masterClrMapping/>
+  </p:clrMapOvr>
+  <p:timing>
+    <p:tnLst>
+      <p:par>
+        <p:cTn id="1" dur="indefinite" restart="never" nodeType="tmRoot"/>
+      </p:par>
+    </p:tnLst>
+  </p:timing>
+</p:sld>
+</file>
+
+<file path=ppt/slides/slide13.xml><?xml version="1.0" encoding="utf-8"?>
+<p:sld xmlns:a="http://schemas.openxmlformats.org/drawingml/2006/main" xmlns:r="http://schemas.openxmlformats.org/officeDocument/2006/relationships" xmlns:p="http://schemas.openxmlformats.org/presentationml/2006/main">
+  <p:cSld>
+    <p:spTree>
+      <p:nvGrpSpPr>
+        <p:cNvPr id="1" name=""/>
+        <p:cNvGrpSpPr/>
+        <p:nvPr/>
+      </p:nvGrpSpPr>
+      <p:grpSpPr>
+        <a:xfrm>
+          <a:off x="0" y="0"/>
+          <a:ext cx="0" cy="0"/>
+          <a:chOff x="0" y="0"/>
+          <a:chExt cx="0" cy="0"/>
+        </a:xfrm>
+      </p:grpSpPr>
+      <p:sp>
+        <p:nvSpPr>
+          <p:cNvPr id="2" name="제목 1"/>
+          <p:cNvSpPr>
+            <a:spLocks noGrp="1"/>
+          </p:cNvSpPr>
+          <p:nvPr>
+            <p:ph type="title"/>
+          </p:nvPr>
+        </p:nvSpPr>
+        <p:spPr/>
+        <p:txBody>
+          <a:bodyPr/>
+          <a:lstStyle/>
+          <a:p>
+            <a:r>
+              <a:rPr lang="en-US" altLang="ko-KR" dirty="0" smtClean="0"/>
+              <a:t>GUI Goal</a:t>
+            </a:r>
+            <a:endParaRPr lang="ko-KR" altLang="en-US" dirty="0"/>
+          </a:p>
+        </p:txBody>
+      </p:sp>
+      <p:sp>
+        <p:nvSpPr>
+          <p:cNvPr id="4" name="Content Placeholder 2"/>
+          <p:cNvSpPr txBox="1">
+            <a:spLocks/>
+          </p:cNvSpPr>
+          <p:nvPr/>
+        </p:nvSpPr>
+        <p:spPr>
+          <a:xfrm>
+            <a:off x="838200" y="1181661"/>
+            <a:ext cx="10515600" cy="4351338"/>
+          </a:xfrm>
+          <a:prstGeom prst="rect">
+            <a:avLst/>
+          </a:prstGeom>
+        </p:spPr>
+        <p:txBody>
+          <a:bodyPr/>
+          <a:lstStyle>
+            <a:lvl1pPr marL="228600" indent="-228600" algn="l" defTabSz="914400" rtl="0" eaLnBrk="1" latinLnBrk="0" hangingPunct="1">
+              <a:lnSpc>
+                <a:spcPct val="90000"/>
+              </a:lnSpc>
+              <a:spcBef>
+                <a:spcPts val="1000"/>
+              </a:spcBef>
+              <a:buFont typeface="Arial"/>
+              <a:buChar char="•"/>
+              <a:defRPr sz="2800" kern="1200">
+                <a:solidFill>
+                  <a:schemeClr val="tx1"/>
+                </a:solidFill>
+                <a:latin typeface="+mn-lt"/>
+                <a:ea typeface="+mn-ea"/>
+                <a:cs typeface="+mn-cs"/>
+              </a:defRPr>
+            </a:lvl1pPr>
+            <a:lvl2pPr marL="685800" indent="-228600" algn="l" defTabSz="914400" rtl="0" eaLnBrk="1" latinLnBrk="0" hangingPunct="1">
+              <a:lnSpc>
+                <a:spcPct val="90000"/>
+              </a:lnSpc>
+              <a:spcBef>
+                <a:spcPts val="500"/>
+              </a:spcBef>
+              <a:buFont typeface="Arial"/>
+              <a:buChar char="•"/>
+              <a:defRPr sz="2400" kern="1200">
+                <a:solidFill>
+                  <a:schemeClr val="tx1"/>
+                </a:solidFill>
+                <a:latin typeface="+mn-lt"/>
+                <a:ea typeface="+mn-ea"/>
+                <a:cs typeface="+mn-cs"/>
+              </a:defRPr>
+            </a:lvl2pPr>
+            <a:lvl3pPr marL="1143000" indent="-228600" algn="l" defTabSz="914400" rtl="0" eaLnBrk="1" latinLnBrk="0" hangingPunct="1">
+              <a:lnSpc>
+                <a:spcPct val="90000"/>
+              </a:lnSpc>
+              <a:spcBef>
+                <a:spcPts val="500"/>
+              </a:spcBef>
+              <a:buFont typeface="Arial"/>
+              <a:buChar char="•"/>
+              <a:defRPr sz="2000" kern="1200">
+                <a:solidFill>
+                  <a:schemeClr val="tx1"/>
+                </a:solidFill>
+                <a:latin typeface="+mn-lt"/>
+                <a:ea typeface="+mn-ea"/>
+                <a:cs typeface="+mn-cs"/>
+              </a:defRPr>
+            </a:lvl3pPr>
+            <a:lvl4pPr marL="1600200" indent="-228600" algn="l" defTabSz="914400" rtl="0" eaLnBrk="1" latinLnBrk="0" hangingPunct="1">
+              <a:lnSpc>
+                <a:spcPct val="90000"/>
+              </a:lnSpc>
+              <a:spcBef>
+                <a:spcPts val="500"/>
+              </a:spcBef>
+              <a:buFont typeface="Arial"/>
+              <a:buChar char="•"/>
+              <a:defRPr sz="1800" kern="1200">
+                <a:solidFill>
+                  <a:schemeClr val="tx1"/>
+                </a:solidFill>
+                <a:latin typeface="+mn-lt"/>
+                <a:ea typeface="+mn-ea"/>
+                <a:cs typeface="+mn-cs"/>
+              </a:defRPr>
+            </a:lvl4pPr>
+            <a:lvl5pPr marL="2057400" indent="-228600" algn="l" defTabSz="914400" rtl="0" eaLnBrk="1" latinLnBrk="0" hangingPunct="1">
+              <a:lnSpc>
+                <a:spcPct val="90000"/>
+              </a:lnSpc>
+              <a:spcBef>
+                <a:spcPts val="500"/>
+              </a:spcBef>
+              <a:buFont typeface="Arial"/>
+              <a:buChar char="•"/>
+              <a:defRPr sz="1800" kern="1200">
+                <a:solidFill>
+                  <a:schemeClr val="tx1"/>
+                </a:solidFill>
+                <a:latin typeface="+mn-lt"/>
+                <a:ea typeface="+mn-ea"/>
+                <a:cs typeface="+mn-cs"/>
+              </a:defRPr>
+            </a:lvl5pPr>
+            <a:lvl6pPr marL="2514600" indent="-228600" algn="l" defTabSz="914400" rtl="0" eaLnBrk="1" latinLnBrk="0" hangingPunct="1">
+              <a:lnSpc>
+                <a:spcPct val="90000"/>
+              </a:lnSpc>
+              <a:spcBef>
+                <a:spcPts val="500"/>
+              </a:spcBef>
+              <a:buFont typeface="Arial"/>
+              <a:buChar char="•"/>
+              <a:defRPr sz="1800" kern="1200">
+                <a:solidFill>
+                  <a:schemeClr val="tx1"/>
+                </a:solidFill>
+                <a:latin typeface="+mn-lt"/>
+                <a:ea typeface="+mn-ea"/>
+                <a:cs typeface="+mn-cs"/>
+              </a:defRPr>
+            </a:lvl6pPr>
+            <a:lvl7pPr marL="2971800" indent="-228600" algn="l" defTabSz="914400" rtl="0" eaLnBrk="1" latinLnBrk="0" hangingPunct="1">
+              <a:lnSpc>
+                <a:spcPct val="90000"/>
+              </a:lnSpc>
+              <a:spcBef>
+                <a:spcPts val="500"/>
+              </a:spcBef>
+              <a:buFont typeface="Arial"/>
+              <a:buChar char="•"/>
+              <a:defRPr sz="1800" kern="1200">
+                <a:solidFill>
+                  <a:schemeClr val="tx1"/>
+                </a:solidFill>
+                <a:latin typeface="+mn-lt"/>
+                <a:ea typeface="+mn-ea"/>
+                <a:cs typeface="+mn-cs"/>
+              </a:defRPr>
+            </a:lvl7pPr>
+            <a:lvl8pPr marL="3429000" indent="-228600" algn="l" defTabSz="914400" rtl="0" eaLnBrk="1" latinLnBrk="0" hangingPunct="1">
+              <a:lnSpc>
+                <a:spcPct val="90000"/>
+              </a:lnSpc>
+              <a:spcBef>
+                <a:spcPts val="500"/>
+              </a:spcBef>
+              <a:buFont typeface="Arial"/>
+              <a:buChar char="•"/>
+              <a:defRPr sz="1800" kern="1200">
+                <a:solidFill>
+                  <a:schemeClr val="tx1"/>
+                </a:solidFill>
+                <a:latin typeface="+mn-lt"/>
+                <a:ea typeface="+mn-ea"/>
+                <a:cs typeface="+mn-cs"/>
+              </a:defRPr>
+            </a:lvl8pPr>
+            <a:lvl9pPr marL="3886200" indent="-228600" algn="l" defTabSz="914400" rtl="0" eaLnBrk="1" latinLnBrk="0" hangingPunct="1">
+              <a:lnSpc>
+                <a:spcPct val="90000"/>
+              </a:lnSpc>
+              <a:spcBef>
+                <a:spcPts val="500"/>
+              </a:spcBef>
+              <a:buFont typeface="Arial"/>
+              <a:buChar char="•"/>
+              <a:defRPr sz="1800" kern="1200">
+                <a:solidFill>
+                  <a:schemeClr val="tx1"/>
+                </a:solidFill>
+                <a:latin typeface="+mn-lt"/>
+                <a:ea typeface="+mn-ea"/>
+                <a:cs typeface="+mn-cs"/>
+              </a:defRPr>
+            </a:lvl9pPr>
+          </a:lstStyle>
+          <a:p>
+            <a:pPr marL="0" indent="0">
+              <a:lnSpc>
+                <a:spcPct val="100000"/>
+              </a:lnSpc>
+              <a:buNone/>
+            </a:pPr>
+            <a:endParaRPr lang="en-US" sz="2000" dirty="0"/>
+          </a:p>
+        </p:txBody>
+      </p:sp>
       <p:sp>
         <p:nvSpPr>
           <p:cNvPr id="5" name="TextBox 4"/>
@@ -5542,7 +6010,7 @@
 </p:sld>
 </file>
 
-<file path=ppt/slides/slide12.xml><?xml version="1.0" encoding="utf-8"?>
+<file path=ppt/slides/slide14.xml><?xml version="1.0" encoding="utf-8"?>
 <p:sld xmlns:a="http://schemas.openxmlformats.org/drawingml/2006/main" xmlns:r="http://schemas.openxmlformats.org/officeDocument/2006/relationships" xmlns:p="http://schemas.openxmlformats.org/presentationml/2006/main">
   <p:cSld>
     <p:spTree>
@@ -6339,7 +6807,7 @@
 </p:sld>
 </file>
 
-<file path=ppt/slides/slide13.xml><?xml version="1.0" encoding="utf-8"?>
+<file path=ppt/slides/slide15.xml><?xml version="1.0" encoding="utf-8"?>
 <p:sld xmlns:a="http://schemas.openxmlformats.org/drawingml/2006/main" xmlns:r="http://schemas.openxmlformats.org/officeDocument/2006/relationships" xmlns:p="http://schemas.openxmlformats.org/presentationml/2006/main">
   <p:cSld>
     <p:spTree>
@@ -6418,6 +6886,399 @@
       </p:grpSpPr>
       <p:sp>
         <p:nvSpPr>
+          <p:cNvPr id="2" name="제목 1"/>
+          <p:cNvSpPr>
+            <a:spLocks noGrp="1"/>
+          </p:cNvSpPr>
+          <p:nvPr>
+            <p:ph type="title"/>
+          </p:nvPr>
+        </p:nvSpPr>
+        <p:spPr/>
+        <p:txBody>
+          <a:bodyPr/>
+          <a:lstStyle/>
+          <a:p>
+            <a:r>
+              <a:rPr lang="en-US" altLang="ko-KR" dirty="0" smtClean="0"/>
+              <a:t>Class Diagram </a:t>
+            </a:r>
+            <a:r>
+              <a:rPr lang="ko-KR" altLang="en-US" dirty="0" smtClean="0"/>
+              <a:t>추가할 점</a:t>
+            </a:r>
+            <a:endParaRPr lang="ko-KR" altLang="en-US" dirty="0"/>
+          </a:p>
+        </p:txBody>
+      </p:sp>
+      <p:sp>
+        <p:nvSpPr>
+          <p:cNvPr id="3" name="TextBox 2"/>
+          <p:cNvSpPr txBox="1"/>
+          <p:nvPr/>
+        </p:nvSpPr>
+        <p:spPr>
+          <a:xfrm>
+            <a:off x="1160583" y="1406770"/>
+            <a:ext cx="5979329" cy="1200329"/>
+          </a:xfrm>
+          <a:prstGeom prst="rect">
+            <a:avLst/>
+          </a:prstGeom>
+          <a:noFill/>
+        </p:spPr>
+        <p:txBody>
+          <a:bodyPr wrap="none" rtlCol="0">
+            <a:spAutoFit/>
+          </a:bodyPr>
+          <a:lstStyle/>
+          <a:p>
+            <a:pPr marL="285750" indent="-285750">
+              <a:buFont typeface="Arial" charset="0"/>
+              <a:buChar char="•"/>
+            </a:pPr>
+            <a:r>
+              <a:rPr kumimoji="1" lang="en-US" altLang="ko-KR" dirty="0" err="1" smtClean="0"/>
+              <a:t>TestItem</a:t>
+            </a:r>
+            <a:r>
+              <a:rPr kumimoji="1" lang="ko-KR" altLang="en-US" dirty="0" smtClean="0"/>
+              <a:t>에 </a:t>
+            </a:r>
+            <a:r>
+              <a:rPr kumimoji="1" lang="en-US" altLang="ko-KR" dirty="0" smtClean="0"/>
+              <a:t>sub-item</a:t>
+            </a:r>
+            <a:r>
+              <a:rPr kumimoji="1" lang="ko-KR" altLang="en-US" dirty="0" smtClean="0"/>
+              <a:t>이 존재함</a:t>
+            </a:r>
+          </a:p>
+          <a:p>
+            <a:pPr marL="285750" indent="-285750">
+              <a:buFont typeface="Arial" charset="0"/>
+              <a:buChar char="•"/>
+            </a:pPr>
+            <a:r>
+              <a:rPr kumimoji="1" lang="en-US" altLang="ko-KR" dirty="0" err="1" smtClean="0"/>
+              <a:t>TestValue</a:t>
+            </a:r>
+            <a:r>
+              <a:rPr kumimoji="1" lang="ko-KR" altLang="en-US" dirty="0" smtClean="0"/>
+              <a:t>의 </a:t>
+            </a:r>
+            <a:r>
+              <a:rPr kumimoji="1" lang="en-US" altLang="ko-KR" dirty="0" err="1" smtClean="0"/>
+              <a:t>StringValue</a:t>
+            </a:r>
+            <a:r>
+              <a:rPr kumimoji="1" lang="ko-KR" altLang="en-US" dirty="0" smtClean="0"/>
+              <a:t>에 대한 정확한 구현 범위가 필요</a:t>
+            </a:r>
+            <a:endParaRPr kumimoji="1" lang="ko-KR" altLang="en-US" dirty="0"/>
+          </a:p>
+          <a:p>
+            <a:pPr marL="285750" indent="-285750">
+              <a:buFont typeface="Arial" charset="0"/>
+              <a:buChar char="•"/>
+            </a:pPr>
+            <a:r>
+              <a:rPr kumimoji="1" lang="en-US" altLang="ko-KR" dirty="0" err="1" smtClean="0"/>
+              <a:t>TestChecker</a:t>
+            </a:r>
+            <a:r>
+              <a:rPr kumimoji="1" lang="ko-KR" altLang="en-US" dirty="0" smtClean="0"/>
+              <a:t>와 </a:t>
+            </a:r>
+            <a:r>
+              <a:rPr kumimoji="1" lang="en-US" altLang="ko-KR" dirty="0" err="1" smtClean="0"/>
+              <a:t>TestDomain</a:t>
+            </a:r>
+            <a:r>
+              <a:rPr kumimoji="1" lang="ko-KR" altLang="en-US" dirty="0" smtClean="0"/>
+              <a:t> 구현 필요</a:t>
+            </a:r>
+          </a:p>
+          <a:p>
+            <a:pPr marL="285750" indent="-285750">
+              <a:buFont typeface="Arial" charset="0"/>
+              <a:buChar char="•"/>
+            </a:pPr>
+            <a:endParaRPr kumimoji="1" lang="ko-KR" altLang="en-US" dirty="0"/>
+          </a:p>
+        </p:txBody>
+      </p:sp>
+    </p:spTree>
+    <p:extLst>
+      <p:ext uri="{BB962C8B-B14F-4D97-AF65-F5344CB8AC3E}">
+        <p14:creationId xmlns:p14="http://schemas.microsoft.com/office/powerpoint/2010/main" val="86709707"/>
+      </p:ext>
+    </p:extLst>
+  </p:cSld>
+  <p:clrMapOvr>
+    <a:masterClrMapping/>
+  </p:clrMapOvr>
+  <p:timing>
+    <p:tnLst>
+      <p:par>
+        <p:cTn id="1" dur="indefinite" restart="never" nodeType="tmRoot"/>
+      </p:par>
+    </p:tnLst>
+  </p:timing>
+</p:sld>
+</file>
+
+<file path=ppt/slides/slide3.xml><?xml version="1.0" encoding="utf-8"?>
+<p:sld xmlns:a="http://schemas.openxmlformats.org/drawingml/2006/main" xmlns:r="http://schemas.openxmlformats.org/officeDocument/2006/relationships" xmlns:p="http://schemas.openxmlformats.org/presentationml/2006/main">
+  <p:cSld>
+    <p:spTree>
+      <p:nvGrpSpPr>
+        <p:cNvPr id="1" name=""/>
+        <p:cNvGrpSpPr/>
+        <p:nvPr/>
+      </p:nvGrpSpPr>
+      <p:grpSpPr>
+        <a:xfrm>
+          <a:off x="0" y="0"/>
+          <a:ext cx="0" cy="0"/>
+          <a:chOff x="0" y="0"/>
+          <a:chExt cx="0" cy="0"/>
+        </a:xfrm>
+      </p:grpSpPr>
+      <p:sp>
+        <p:nvSpPr>
+          <p:cNvPr id="2" name="제목 1"/>
+          <p:cNvSpPr>
+            <a:spLocks noGrp="1"/>
+          </p:cNvSpPr>
+          <p:nvPr>
+            <p:ph type="title"/>
+          </p:nvPr>
+        </p:nvSpPr>
+        <p:spPr/>
+        <p:txBody>
+          <a:bodyPr/>
+          <a:lstStyle/>
+          <a:p>
+            <a:r>
+              <a:rPr lang="ko-KR" altLang="en-US" dirty="0" smtClean="0"/>
+              <a:t>참고할만한 </a:t>
+            </a:r>
+            <a:r>
+              <a:rPr lang="en-US" altLang="ko-KR" dirty="0" smtClean="0"/>
+              <a:t>Library</a:t>
+            </a:r>
+            <a:endParaRPr lang="ko-KR" altLang="en-US" dirty="0"/>
+          </a:p>
+        </p:txBody>
+      </p:sp>
+      <p:sp>
+        <p:nvSpPr>
+          <p:cNvPr id="3" name="TextBox 2"/>
+          <p:cNvSpPr txBox="1"/>
+          <p:nvPr/>
+        </p:nvSpPr>
+        <p:spPr>
+          <a:xfrm>
+            <a:off x="1385804" y="1343465"/>
+            <a:ext cx="5690469" cy="1754326"/>
+          </a:xfrm>
+          <a:prstGeom prst="rect">
+            <a:avLst/>
+          </a:prstGeom>
+          <a:noFill/>
+        </p:spPr>
+        <p:txBody>
+          <a:bodyPr wrap="none" rtlCol="0">
+            <a:spAutoFit/>
+          </a:bodyPr>
+          <a:lstStyle/>
+          <a:p>
+            <a:pPr marL="285750" indent="-285750">
+              <a:buFont typeface="Arial" charset="0"/>
+              <a:buChar char="•"/>
+            </a:pPr>
+            <a:r>
+              <a:rPr kumimoji="1" lang="en-US" altLang="ko-KR" dirty="0" smtClean="0"/>
+              <a:t>Controls FX</a:t>
+            </a:r>
+            <a:r>
+              <a:rPr kumimoji="1" lang="ko-KR" altLang="en-US" dirty="0" smtClean="0"/>
+              <a:t> </a:t>
+            </a:r>
+            <a:r>
+              <a:rPr kumimoji="1" lang="en-US" altLang="ko-KR" dirty="0" smtClean="0"/>
+              <a:t>:</a:t>
+            </a:r>
+            <a:r>
+              <a:rPr kumimoji="1" lang="ko-KR" altLang="en-US" dirty="0" smtClean="0"/>
+              <a:t> </a:t>
+            </a:r>
+            <a:r>
+              <a:rPr kumimoji="1" lang="ko-KR" altLang="en-US" dirty="0" smtClean="0"/>
+              <a:t>좋은 </a:t>
+            </a:r>
+            <a:r>
+              <a:rPr kumimoji="1" lang="en-US" altLang="ko-KR" dirty="0" err="1" smtClean="0"/>
+              <a:t>JavaFX</a:t>
+            </a:r>
+            <a:r>
+              <a:rPr kumimoji="1" lang="en-US" altLang="ko-KR" dirty="0" smtClean="0"/>
+              <a:t> </a:t>
+            </a:r>
+            <a:r>
+              <a:rPr kumimoji="1" lang="en-US" altLang="ko-KR" dirty="0" smtClean="0"/>
+              <a:t>Control</a:t>
+            </a:r>
+            <a:r>
+              <a:rPr kumimoji="1" lang="ko-KR" altLang="en-US" dirty="0" smtClean="0"/>
+              <a:t>을 모아놓은 </a:t>
+            </a:r>
+            <a:r>
+              <a:rPr kumimoji="1" lang="en-US" altLang="ko-KR" dirty="0" smtClean="0"/>
+              <a:t>Library</a:t>
+            </a:r>
+            <a:endParaRPr kumimoji="1" lang="en-US" altLang="ko-KR" dirty="0" smtClean="0"/>
+          </a:p>
+          <a:p>
+            <a:pPr marL="742950" lvl="1" indent="-285750">
+              <a:buFont typeface="Arial" charset="0"/>
+              <a:buChar char="•"/>
+            </a:pPr>
+            <a:r>
+              <a:rPr kumimoji="1" lang="en-US" altLang="ko-KR" dirty="0">
+                <a:hlinkClick r:id="rId2"/>
+              </a:rPr>
+              <a:t>http://fxexperience.com/controlsfx</a:t>
+            </a:r>
+            <a:r>
+              <a:rPr kumimoji="1" lang="en-US" altLang="ko-KR" dirty="0" smtClean="0">
+                <a:hlinkClick r:id="rId2"/>
+              </a:rPr>
+              <a:t>/</a:t>
+            </a:r>
+            <a:endParaRPr kumimoji="1" lang="ko-KR" altLang="en-US" dirty="0" smtClean="0"/>
+          </a:p>
+          <a:p>
+            <a:pPr marL="285750" indent="-285750">
+              <a:buFont typeface="Arial" charset="0"/>
+              <a:buChar char="•"/>
+            </a:pPr>
+            <a:r>
+              <a:rPr kumimoji="1" lang="en-US" altLang="ko-KR" dirty="0" smtClean="0"/>
+              <a:t>Apache </a:t>
+            </a:r>
+            <a:r>
+              <a:rPr kumimoji="1" lang="en-US" altLang="ko-KR" dirty="0" err="1" smtClean="0"/>
+              <a:t>Lucene</a:t>
+            </a:r>
+            <a:r>
+              <a:rPr kumimoji="1" lang="en-US" altLang="ko-KR" dirty="0" smtClean="0"/>
+              <a:t> : </a:t>
+            </a:r>
+            <a:r>
+              <a:rPr lang="ko-KR" altLang="de-DE" dirty="0"/>
+              <a:t>확장 가능한 고성능 </a:t>
+            </a:r>
+            <a:r>
+              <a:rPr lang="ko-KR" altLang="de-DE" dirty="0" smtClean="0"/>
+              <a:t>정보검색</a:t>
+            </a:r>
+            <a:r>
+              <a:rPr lang="de-DE" altLang="ko-KR" dirty="0"/>
+              <a:t> </a:t>
+            </a:r>
+            <a:r>
+              <a:rPr lang="de-DE" altLang="ko-KR" dirty="0" smtClean="0"/>
+              <a:t>Library</a:t>
+            </a:r>
+          </a:p>
+          <a:p>
+            <a:pPr marL="742950" lvl="1" indent="-285750">
+              <a:buFont typeface="Arial" charset="0"/>
+              <a:buChar char="•"/>
+            </a:pPr>
+            <a:r>
+              <a:rPr kumimoji="1" lang="de-DE" altLang="ko-KR" dirty="0">
+                <a:hlinkClick r:id="rId3"/>
+              </a:rPr>
+              <a:t>http://</a:t>
+            </a:r>
+            <a:r>
+              <a:rPr kumimoji="1" lang="de-DE" altLang="ko-KR" dirty="0" smtClean="0">
+                <a:hlinkClick r:id="rId3"/>
+              </a:rPr>
+              <a:t>linuxism.tistory.com/898</a:t>
+            </a:r>
+            <a:endParaRPr kumimoji="1" lang="de-DE" altLang="ko-KR" dirty="0" smtClean="0"/>
+          </a:p>
+          <a:p>
+            <a:pPr marL="742950" lvl="1" indent="-285750">
+              <a:buFont typeface="Arial" charset="0"/>
+              <a:buChar char="•"/>
+            </a:pPr>
+            <a:r>
+              <a:rPr kumimoji="1" lang="de-DE" altLang="ko-KR" dirty="0">
+                <a:hlinkClick r:id="rId4"/>
+              </a:rPr>
+              <a:t>http://</a:t>
+            </a:r>
+            <a:r>
+              <a:rPr kumimoji="1" lang="de-DE" altLang="ko-KR" dirty="0" smtClean="0">
+                <a:hlinkClick r:id="rId4"/>
+              </a:rPr>
+              <a:t>lucene.apache.org</a:t>
+            </a:r>
+            <a:endParaRPr kumimoji="1" lang="de-DE" altLang="ko-KR" smtClean="0"/>
+          </a:p>
+          <a:p>
+            <a:pPr marL="742950" lvl="1" indent="-285750">
+              <a:buFont typeface="Arial" charset="0"/>
+              <a:buChar char="•"/>
+            </a:pPr>
+            <a:endParaRPr kumimoji="1" lang="ko-KR" altLang="en-US" dirty="0"/>
+          </a:p>
+        </p:txBody>
+      </p:sp>
+    </p:spTree>
+    <p:extLst>
+      <p:ext uri="{BB962C8B-B14F-4D97-AF65-F5344CB8AC3E}">
+        <p14:creationId xmlns:p14="http://schemas.microsoft.com/office/powerpoint/2010/main" val="555290893"/>
+      </p:ext>
+    </p:extLst>
+  </p:cSld>
+  <p:clrMapOvr>
+    <a:masterClrMapping/>
+  </p:clrMapOvr>
+  <p:timing>
+    <p:tnLst>
+      <p:par>
+        <p:cTn id="1" dur="indefinite" restart="never" nodeType="tmRoot"/>
+      </p:par>
+    </p:tnLst>
+  </p:timing>
+</p:sld>
+</file>
+
+<file path=ppt/slides/slide4.xml><?xml version="1.0" encoding="utf-8"?>
+<p:sld xmlns:a="http://schemas.openxmlformats.org/drawingml/2006/main" xmlns:r="http://schemas.openxmlformats.org/officeDocument/2006/relationships" xmlns:p="http://schemas.openxmlformats.org/presentationml/2006/main">
+  <p:cSld>
+    <p:spTree>
+      <p:nvGrpSpPr>
+        <p:cNvPr id="1" name=""/>
+        <p:cNvGrpSpPr/>
+        <p:nvPr/>
+      </p:nvGrpSpPr>
+      <p:grpSpPr>
+        <a:xfrm>
+          <a:off x="0" y="0"/>
+          <a:ext cx="0" cy="0"/>
+          <a:chOff x="0" y="0"/>
+          <a:chExt cx="0" cy="0"/>
+        </a:xfrm>
+      </p:grpSpPr>
+      <p:sp>
+        <p:nvSpPr>
           <p:cNvPr id="2" name="Text Placeholder 1"/>
           <p:cNvSpPr>
             <a:spLocks noGrp="1"/>
@@ -6535,7 +7396,7 @@
 </p:sld>
 </file>
 
-<file path=ppt/slides/slide3.xml><?xml version="1.0" encoding="utf-8"?>
+<file path=ppt/slides/slide5.xml><?xml version="1.0" encoding="utf-8"?>
 <p:sld xmlns:a="http://schemas.openxmlformats.org/drawingml/2006/main" xmlns:r="http://schemas.openxmlformats.org/officeDocument/2006/relationships" xmlns:p="http://schemas.openxmlformats.org/presentationml/2006/main">
   <p:cSld>
     <p:spTree>
@@ -6637,7 +7498,7 @@
 </p:sld>
 </file>
 
-<file path=ppt/slides/slide4.xml><?xml version="1.0" encoding="utf-8"?>
+<file path=ppt/slides/slide6.xml><?xml version="1.0" encoding="utf-8"?>
 <p:sld xmlns:a="http://schemas.openxmlformats.org/drawingml/2006/main" xmlns:r="http://schemas.openxmlformats.org/officeDocument/2006/relationships" xmlns:p="http://schemas.openxmlformats.org/presentationml/2006/main">
   <p:cSld>
     <p:spTree>
@@ -6881,7 +7742,7 @@
 </p:sld>
 </file>
 
-<file path=ppt/slides/slide5.xml><?xml version="1.0" encoding="utf-8"?>
+<file path=ppt/slides/slide7.xml><?xml version="1.0" encoding="utf-8"?>
 <p:sld xmlns:a="http://schemas.openxmlformats.org/drawingml/2006/main" xmlns:r="http://schemas.openxmlformats.org/officeDocument/2006/relationships" xmlns:p="http://schemas.openxmlformats.org/presentationml/2006/main">
   <p:cSld>
     <p:spTree>
@@ -6983,7 +7844,7 @@
 </p:sld>
 </file>
 
-<file path=ppt/slides/slide6.xml><?xml version="1.0" encoding="utf-8"?>
+<file path=ppt/slides/slide8.xml><?xml version="1.0" encoding="utf-8"?>
 <p:sld xmlns:a="http://schemas.openxmlformats.org/drawingml/2006/main" xmlns:r="http://schemas.openxmlformats.org/officeDocument/2006/relationships" xmlns:p="http://schemas.openxmlformats.org/presentationml/2006/main">
   <p:cSld>
     <p:spTree>
@@ -7141,7 +8002,7 @@
 </p:sld>
 </file>
 
-<file path=ppt/slides/slide7.xml><?xml version="1.0" encoding="utf-8"?>
+<file path=ppt/slides/slide9.xml><?xml version="1.0" encoding="utf-8"?>
 <p:sld xmlns:a="http://schemas.openxmlformats.org/drawingml/2006/main" xmlns:r="http://schemas.openxmlformats.org/officeDocument/2006/relationships" xmlns:p="http://schemas.openxmlformats.org/presentationml/2006/main">
   <p:cSld>
     <p:spTree>
@@ -7995,11 +8856,7 @@
             </a:pPr>
             <a:r>
               <a:rPr lang="en-US" altLang="ko-KR" sz="2000" dirty="0" smtClean="0"/>
-              <a:t>Atom </a:t>
-            </a:r>
-            <a:r>
-              <a:rPr lang="en-US" altLang="ko-KR" sz="2000" dirty="0" smtClean="0"/>
-              <a:t>Navigator</a:t>
+              <a:t>Atom Navigator</a:t>
             </a:r>
           </a:p>
           <a:p>
@@ -8021,7 +8878,6 @@
               <a:rPr lang="en-US" altLang="ko-KR" sz="2000" dirty="0" smtClean="0"/>
               <a:t>Auto Save</a:t>
             </a:r>
-            <a:endParaRPr lang="en-US" altLang="ko-KR" sz="2000" dirty="0" smtClean="0"/>
           </a:p>
           <a:p>
             <a:endParaRPr lang="en-US" sz="2400" dirty="0"/>
@@ -8032,472 +8888,6 @@
     <p:extLst>
       <p:ext uri="{BB962C8B-B14F-4D97-AF65-F5344CB8AC3E}">
         <p14:creationId xmlns:p14="http://schemas.microsoft.com/office/powerpoint/2010/main" val="1430773710"/>
-      </p:ext>
-    </p:extLst>
-  </p:cSld>
-  <p:clrMapOvr>
-    <a:masterClrMapping/>
-  </p:clrMapOvr>
-  <p:timing>
-    <p:tnLst>
-      <p:par>
-        <p:cTn id="1" dur="indefinite" restart="never" nodeType="tmRoot"/>
-      </p:par>
-    </p:tnLst>
-  </p:timing>
-</p:sld>
-</file>
-
-<file path=ppt/slides/slide8.xml><?xml version="1.0" encoding="utf-8"?>
-<p:sld xmlns:a="http://schemas.openxmlformats.org/drawingml/2006/main" xmlns:r="http://schemas.openxmlformats.org/officeDocument/2006/relationships" xmlns:p="http://schemas.openxmlformats.org/presentationml/2006/main">
-  <p:cSld>
-    <p:spTree>
-      <p:nvGrpSpPr>
-        <p:cNvPr id="1" name=""/>
-        <p:cNvGrpSpPr/>
-        <p:nvPr/>
-      </p:nvGrpSpPr>
-      <p:grpSpPr>
-        <a:xfrm>
-          <a:off x="0" y="0"/>
-          <a:ext cx="0" cy="0"/>
-          <a:chOff x="0" y="0"/>
-          <a:chExt cx="0" cy="0"/>
-        </a:xfrm>
-      </p:grpSpPr>
-      <p:sp>
-        <p:nvSpPr>
-          <p:cNvPr id="2" name="Text Placeholder 1"/>
-          <p:cNvSpPr>
-            <a:spLocks noGrp="1"/>
-          </p:cNvSpPr>
-          <p:nvPr>
-            <p:ph type="body" sz="quarter" idx="11"/>
-          </p:nvPr>
-        </p:nvSpPr>
-        <p:spPr/>
-        <p:txBody>
-          <a:bodyPr/>
-          <a:lstStyle/>
-          <a:p>
-            <a:r>
-              <a:rPr lang="ko-KR" altLang="en-US" dirty="0" smtClean="0"/>
-              <a:t>이전 자료</a:t>
-            </a:r>
-            <a:endParaRPr lang="en-US" dirty="0"/>
-          </a:p>
-        </p:txBody>
-      </p:sp>
-      <p:sp>
-        <p:nvSpPr>
-          <p:cNvPr id="3" name="Text Placeholder 2"/>
-          <p:cNvSpPr>
-            <a:spLocks noGrp="1"/>
-          </p:cNvSpPr>
-          <p:nvPr>
-            <p:ph type="body" sz="quarter" idx="12"/>
-          </p:nvPr>
-        </p:nvSpPr>
-        <p:spPr/>
-        <p:txBody>
-          <a:bodyPr/>
-          <a:lstStyle/>
-          <a:p>
-            <a:endParaRPr lang="en-US"/>
-          </a:p>
-        </p:txBody>
-      </p:sp>
-      <p:sp>
-        <p:nvSpPr>
-          <p:cNvPr id="4" name="Text Placeholder 3"/>
-          <p:cNvSpPr>
-            <a:spLocks noGrp="1"/>
-          </p:cNvSpPr>
-          <p:nvPr>
-            <p:ph type="body" sz="quarter" idx="13"/>
-          </p:nvPr>
-        </p:nvSpPr>
-        <p:spPr/>
-        <p:txBody>
-          <a:bodyPr/>
-          <a:lstStyle/>
-          <a:p>
-            <a:endParaRPr lang="en-US"/>
-          </a:p>
-        </p:txBody>
-      </p:sp>
-      <p:sp>
-        <p:nvSpPr>
-          <p:cNvPr id="5" name="Text Placeholder 4"/>
-          <p:cNvSpPr>
-            <a:spLocks noGrp="1"/>
-          </p:cNvSpPr>
-          <p:nvPr>
-            <p:ph type="body" sz="quarter" idx="14"/>
-          </p:nvPr>
-        </p:nvSpPr>
-        <p:spPr/>
-        <p:txBody>
-          <a:bodyPr/>
-          <a:lstStyle/>
-          <a:p>
-            <a:endParaRPr lang="en-US"/>
-          </a:p>
-        </p:txBody>
-      </p:sp>
-      <p:sp>
-        <p:nvSpPr>
-          <p:cNvPr id="6" name="Title 5"/>
-          <p:cNvSpPr>
-            <a:spLocks noGrp="1"/>
-          </p:cNvSpPr>
-          <p:nvPr>
-            <p:ph type="title"/>
-          </p:nvPr>
-        </p:nvSpPr>
-        <p:spPr/>
-        <p:txBody>
-          <a:bodyPr/>
-          <a:lstStyle/>
-          <a:p>
-            <a:endParaRPr lang="en-US"/>
-          </a:p>
-        </p:txBody>
-      </p:sp>
-    </p:spTree>
-    <p:extLst>
-      <p:ext uri="{BB962C8B-B14F-4D97-AF65-F5344CB8AC3E}">
-        <p14:creationId xmlns:p14="http://schemas.microsoft.com/office/powerpoint/2010/main" val="1923305761"/>
-      </p:ext>
-    </p:extLst>
-  </p:cSld>
-  <p:clrMapOvr>
-    <a:masterClrMapping/>
-  </p:clrMapOvr>
-  <p:timing>
-    <p:tnLst>
-      <p:par>
-        <p:cTn id="1" dur="indefinite" restart="never" nodeType="tmRoot"/>
-      </p:par>
-    </p:tnLst>
-  </p:timing>
-</p:sld>
-</file>
-
-<file path=ppt/slides/slide9.xml><?xml version="1.0" encoding="utf-8"?>
-<p:sld xmlns:a="http://schemas.openxmlformats.org/drawingml/2006/main" xmlns:r="http://schemas.openxmlformats.org/officeDocument/2006/relationships" xmlns:p="http://schemas.openxmlformats.org/presentationml/2006/main">
-  <p:cSld>
-    <p:spTree>
-      <p:nvGrpSpPr>
-        <p:cNvPr id="1" name=""/>
-        <p:cNvGrpSpPr/>
-        <p:nvPr/>
-      </p:nvGrpSpPr>
-      <p:grpSpPr>
-        <a:xfrm>
-          <a:off x="0" y="0"/>
-          <a:ext cx="0" cy="0"/>
-          <a:chOff x="0" y="0"/>
-          <a:chExt cx="0" cy="0"/>
-        </a:xfrm>
-      </p:grpSpPr>
-      <p:sp>
-        <p:nvSpPr>
-          <p:cNvPr id="2" name="제목 1"/>
-          <p:cNvSpPr>
-            <a:spLocks noGrp="1"/>
-          </p:cNvSpPr>
-          <p:nvPr>
-            <p:ph type="title"/>
-          </p:nvPr>
-        </p:nvSpPr>
-        <p:spPr/>
-        <p:txBody>
-          <a:bodyPr/>
-          <a:lstStyle/>
-          <a:p>
-            <a:r>
-              <a:rPr lang="en-US" altLang="ko-KR" dirty="0" smtClean="0"/>
-              <a:t>GUI </a:t>
-            </a:r>
-            <a:r>
-              <a:rPr lang="ko-KR" altLang="en-US" dirty="0" smtClean="0"/>
-              <a:t>가이드 라인 </a:t>
-            </a:r>
-            <a:r>
-              <a:rPr lang="en-US" altLang="ko-KR" dirty="0" err="1" smtClean="0"/>
-              <a:t>Ver</a:t>
-            </a:r>
-            <a:r>
-              <a:rPr lang="en-US" altLang="ko-KR" dirty="0" smtClean="0"/>
-              <a:t> 0.1</a:t>
-            </a:r>
-            <a:endParaRPr lang="ko-KR" altLang="en-US" dirty="0"/>
-          </a:p>
-        </p:txBody>
-      </p:sp>
-      <p:sp>
-        <p:nvSpPr>
-          <p:cNvPr id="4" name="Content Placeholder 2"/>
-          <p:cNvSpPr txBox="1">
-            <a:spLocks/>
-          </p:cNvSpPr>
-          <p:nvPr/>
-        </p:nvSpPr>
-        <p:spPr>
-          <a:xfrm>
-            <a:off x="838200" y="1181661"/>
-            <a:ext cx="10515600" cy="4351338"/>
-          </a:xfrm>
-          <a:prstGeom prst="rect">
-            <a:avLst/>
-          </a:prstGeom>
-        </p:spPr>
-        <p:txBody>
-          <a:bodyPr/>
-          <a:lstStyle>
-            <a:lvl1pPr marL="228600" indent="-228600" algn="l" defTabSz="914400" rtl="0" eaLnBrk="1" latinLnBrk="0" hangingPunct="1">
-              <a:lnSpc>
-                <a:spcPct val="90000"/>
-              </a:lnSpc>
-              <a:spcBef>
-                <a:spcPts val="1000"/>
-              </a:spcBef>
-              <a:buFont typeface="Arial"/>
-              <a:buChar char="•"/>
-              <a:defRPr sz="2800" kern="1200">
-                <a:solidFill>
-                  <a:schemeClr val="tx1"/>
-                </a:solidFill>
-                <a:latin typeface="+mn-lt"/>
-                <a:ea typeface="+mn-ea"/>
-                <a:cs typeface="+mn-cs"/>
-              </a:defRPr>
-            </a:lvl1pPr>
-            <a:lvl2pPr marL="685800" indent="-228600" algn="l" defTabSz="914400" rtl="0" eaLnBrk="1" latinLnBrk="0" hangingPunct="1">
-              <a:lnSpc>
-                <a:spcPct val="90000"/>
-              </a:lnSpc>
-              <a:spcBef>
-                <a:spcPts val="500"/>
-              </a:spcBef>
-              <a:buFont typeface="Arial"/>
-              <a:buChar char="•"/>
-              <a:defRPr sz="2400" kern="1200">
-                <a:solidFill>
-                  <a:schemeClr val="tx1"/>
-                </a:solidFill>
-                <a:latin typeface="+mn-lt"/>
-                <a:ea typeface="+mn-ea"/>
-                <a:cs typeface="+mn-cs"/>
-              </a:defRPr>
-            </a:lvl2pPr>
-            <a:lvl3pPr marL="1143000" indent="-228600" algn="l" defTabSz="914400" rtl="0" eaLnBrk="1" latinLnBrk="0" hangingPunct="1">
-              <a:lnSpc>
-                <a:spcPct val="90000"/>
-              </a:lnSpc>
-              <a:spcBef>
-                <a:spcPts val="500"/>
-              </a:spcBef>
-              <a:buFont typeface="Arial"/>
-              <a:buChar char="•"/>
-              <a:defRPr sz="2000" kern="1200">
-                <a:solidFill>
-                  <a:schemeClr val="tx1"/>
-                </a:solidFill>
-                <a:latin typeface="+mn-lt"/>
-                <a:ea typeface="+mn-ea"/>
-                <a:cs typeface="+mn-cs"/>
-              </a:defRPr>
-            </a:lvl3pPr>
-            <a:lvl4pPr marL="1600200" indent="-228600" algn="l" defTabSz="914400" rtl="0" eaLnBrk="1" latinLnBrk="0" hangingPunct="1">
-              <a:lnSpc>
-                <a:spcPct val="90000"/>
-              </a:lnSpc>
-              <a:spcBef>
-                <a:spcPts val="500"/>
-              </a:spcBef>
-              <a:buFont typeface="Arial"/>
-              <a:buChar char="•"/>
-              <a:defRPr sz="1800" kern="1200">
-                <a:solidFill>
-                  <a:schemeClr val="tx1"/>
-                </a:solidFill>
-                <a:latin typeface="+mn-lt"/>
-                <a:ea typeface="+mn-ea"/>
-                <a:cs typeface="+mn-cs"/>
-              </a:defRPr>
-            </a:lvl4pPr>
-            <a:lvl5pPr marL="2057400" indent="-228600" algn="l" defTabSz="914400" rtl="0" eaLnBrk="1" latinLnBrk="0" hangingPunct="1">
-              <a:lnSpc>
-                <a:spcPct val="90000"/>
-              </a:lnSpc>
-              <a:spcBef>
-                <a:spcPts val="500"/>
-              </a:spcBef>
-              <a:buFont typeface="Arial"/>
-              <a:buChar char="•"/>
-              <a:defRPr sz="1800" kern="1200">
-                <a:solidFill>
-                  <a:schemeClr val="tx1"/>
-                </a:solidFill>
-                <a:latin typeface="+mn-lt"/>
-                <a:ea typeface="+mn-ea"/>
-                <a:cs typeface="+mn-cs"/>
-              </a:defRPr>
-            </a:lvl5pPr>
-            <a:lvl6pPr marL="2514600" indent="-228600" algn="l" defTabSz="914400" rtl="0" eaLnBrk="1" latinLnBrk="0" hangingPunct="1">
-              <a:lnSpc>
-                <a:spcPct val="90000"/>
-              </a:lnSpc>
-              <a:spcBef>
-                <a:spcPts val="500"/>
-              </a:spcBef>
-              <a:buFont typeface="Arial"/>
-              <a:buChar char="•"/>
-              <a:defRPr sz="1800" kern="1200">
-                <a:solidFill>
-                  <a:schemeClr val="tx1"/>
-                </a:solidFill>
-                <a:latin typeface="+mn-lt"/>
-                <a:ea typeface="+mn-ea"/>
-                <a:cs typeface="+mn-cs"/>
-              </a:defRPr>
-            </a:lvl6pPr>
-            <a:lvl7pPr marL="2971800" indent="-228600" algn="l" defTabSz="914400" rtl="0" eaLnBrk="1" latinLnBrk="0" hangingPunct="1">
-              <a:lnSpc>
-                <a:spcPct val="90000"/>
-              </a:lnSpc>
-              <a:spcBef>
-                <a:spcPts val="500"/>
-              </a:spcBef>
-              <a:buFont typeface="Arial"/>
-              <a:buChar char="•"/>
-              <a:defRPr sz="1800" kern="1200">
-                <a:solidFill>
-                  <a:schemeClr val="tx1"/>
-                </a:solidFill>
-                <a:latin typeface="+mn-lt"/>
-                <a:ea typeface="+mn-ea"/>
-                <a:cs typeface="+mn-cs"/>
-              </a:defRPr>
-            </a:lvl7pPr>
-            <a:lvl8pPr marL="3429000" indent="-228600" algn="l" defTabSz="914400" rtl="0" eaLnBrk="1" latinLnBrk="0" hangingPunct="1">
-              <a:lnSpc>
-                <a:spcPct val="90000"/>
-              </a:lnSpc>
-              <a:spcBef>
-                <a:spcPts val="500"/>
-              </a:spcBef>
-              <a:buFont typeface="Arial"/>
-              <a:buChar char="•"/>
-              <a:defRPr sz="1800" kern="1200">
-                <a:solidFill>
-                  <a:schemeClr val="tx1"/>
-                </a:solidFill>
-                <a:latin typeface="+mn-lt"/>
-                <a:ea typeface="+mn-ea"/>
-                <a:cs typeface="+mn-cs"/>
-              </a:defRPr>
-            </a:lvl8pPr>
-            <a:lvl9pPr marL="3886200" indent="-228600" algn="l" defTabSz="914400" rtl="0" eaLnBrk="1" latinLnBrk="0" hangingPunct="1">
-              <a:lnSpc>
-                <a:spcPct val="90000"/>
-              </a:lnSpc>
-              <a:spcBef>
-                <a:spcPts val="500"/>
-              </a:spcBef>
-              <a:buFont typeface="Arial"/>
-              <a:buChar char="•"/>
-              <a:defRPr sz="1800" kern="1200">
-                <a:solidFill>
-                  <a:schemeClr val="tx1"/>
-                </a:solidFill>
-                <a:latin typeface="+mn-lt"/>
-                <a:ea typeface="+mn-ea"/>
-                <a:cs typeface="+mn-cs"/>
-              </a:defRPr>
-            </a:lvl9pPr>
-          </a:lstStyle>
-          <a:p>
-            <a:pPr marL="0" indent="0">
-              <a:lnSpc>
-                <a:spcPct val="100000"/>
-              </a:lnSpc>
-              <a:buNone/>
-            </a:pPr>
-            <a:endParaRPr lang="en-US" sz="2000" dirty="0"/>
-          </a:p>
-        </p:txBody>
-      </p:sp>
-      <p:pic>
-        <p:nvPicPr>
-          <p:cNvPr id="13" name="Picture 12"/>
-          <p:cNvPicPr>
-            <a:picLocks noChangeAspect="1"/>
-          </p:cNvPicPr>
-          <p:nvPr/>
-        </p:nvPicPr>
-        <p:blipFill>
-          <a:blip r:embed="rId2">
-            <a:extLst>
-              <a:ext uri="{28A0092B-C50C-407E-A947-70E740481C1C}">
-                <a14:useLocalDpi xmlns:a14="http://schemas.microsoft.com/office/drawing/2010/main" val="0"/>
-              </a:ext>
-            </a:extLst>
-          </a:blip>
-          <a:stretch>
-            <a:fillRect/>
-          </a:stretch>
-        </p:blipFill>
-        <p:spPr>
-          <a:xfrm>
-            <a:off x="1998787" y="1773620"/>
-            <a:ext cx="8745414" cy="4548650"/>
-          </a:xfrm>
-          <a:prstGeom prst="rect">
-            <a:avLst/>
-          </a:prstGeom>
-        </p:spPr>
-      </p:pic>
-      <p:sp>
-        <p:nvSpPr>
-          <p:cNvPr id="15" name="TextBox 14"/>
-          <p:cNvSpPr txBox="1"/>
-          <p:nvPr/>
-        </p:nvSpPr>
-        <p:spPr>
-          <a:xfrm>
-            <a:off x="838200" y="1325213"/>
-            <a:ext cx="6152646" cy="369332"/>
-          </a:xfrm>
-          <a:prstGeom prst="rect">
-            <a:avLst/>
-          </a:prstGeom>
-          <a:noFill/>
-        </p:spPr>
-        <p:txBody>
-          <a:bodyPr wrap="none" rtlCol="0">
-            <a:spAutoFit/>
-          </a:bodyPr>
-          <a:lstStyle/>
-          <a:p>
-            <a:pPr marL="285750" indent="-285750">
-              <a:buFont typeface="Arial" charset="0"/>
-              <a:buChar char="•"/>
-            </a:pPr>
-            <a:r>
-              <a:rPr lang="ko-KR" altLang="en-US" smtClean="0"/>
-              <a:t>기능적 가이드 라인이기 때문에 사용 편의성이 높지 않음</a:t>
-            </a:r>
-            <a:endParaRPr lang="en-US" dirty="0"/>
-          </a:p>
-        </p:txBody>
-      </p:sp>
-    </p:spTree>
-    <p:extLst>
-      <p:ext uri="{BB962C8B-B14F-4D97-AF65-F5344CB8AC3E}">
-        <p14:creationId xmlns:p14="http://schemas.microsoft.com/office/powerpoint/2010/main" val="318561886"/>
       </p:ext>
     </p:extLst>
   </p:cSld>

</xml_diff>